<commit_message>
Added chart template to pptx
</commit_message>
<xml_diff>
--- a/src/main/resources/templates/presentation-template.pptx
+++ b/src/main/resources/templates/presentation-template.pptx
@@ -5,11 +5,11 @@
     <p:sldMasterId id="2147483648" r:id="rId1"/>
   </p:sldMasterIdLst>
   <p:sldIdLst>
-    <p:sldId id="256" r:id="rId6"/>
-    <p:sldId id="257" r:id="rId7"/>
-    <p:sldId id="258" r:id="rId8"/>
+    <p:sldId id="256" r:id="rId2"/>
+    <p:sldId id="257" r:id="rId3"/>
+    <p:sldId id="258" r:id="rId4"/>
   </p:sldIdLst>
-  <p:sldSz cx="9144000" cy="6858000"/>
+  <p:sldSz cx="9144000" cy="6858000" type="screen4x3"/>
   <p:notesSz cx="6858000" cy="9144000"/>
   <p:defaultTextStyle>
     <a:defPPr>
@@ -106,7 +106,2254 @@
       </a:defRPr>
     </a:lvl9pPr>
   </p:defaultTextStyle>
+  <p:extLst>
+    <p:ext uri="{EFAFB233-063F-42B5-8137-9DF3F51BA10A}">
+      <p15:sldGuideLst xmlns:p15="http://schemas.microsoft.com/office/powerpoint/2012/main">
+        <p15:guide id="1" orient="horz" pos="2160">
+          <p15:clr>
+            <a:srgbClr val="A4A3A4"/>
+          </p15:clr>
+        </p15:guide>
+        <p15:guide id="2" pos="2880">
+          <p15:clr>
+            <a:srgbClr val="A4A3A4"/>
+          </p15:clr>
+        </p15:guide>
+      </p15:sldGuideLst>
+    </p:ext>
+  </p:extLst>
 </p:presentation>
+</file>
+
+<file path=ppt/charts/chart1.xml><?xml version="1.0" encoding="utf-8"?>
+<c:chartSpace xmlns:c="http://schemas.openxmlformats.org/drawingml/2006/chart" xmlns:a="http://schemas.openxmlformats.org/drawingml/2006/main" xmlns:r="http://schemas.openxmlformats.org/officeDocument/2006/relationships" xmlns:c16r2="http://schemas.microsoft.com/office/drawing/2015/06/chart">
+  <c:date1904 val="0"/>
+  <c:lang val="en-US"/>
+  <c:roundedCorners val="0"/>
+  <mc:AlternateContent xmlns:mc="http://schemas.openxmlformats.org/markup-compatibility/2006">
+    <mc:Choice xmlns:c14="http://schemas.microsoft.com/office/drawing/2007/8/2/chart" Requires="c14">
+      <c14:style val="102"/>
+    </mc:Choice>
+    <mc:Fallback>
+      <c:style val="2"/>
+    </mc:Fallback>
+  </mc:AlternateContent>
+  <c:chart>
+    <c:autoTitleDeleted val="0"/>
+    <c:plotArea>
+      <c:layout>
+        <c:manualLayout>
+          <c:layoutTarget val="inner"/>
+          <c:xMode val="edge"/>
+          <c:yMode val="edge"/>
+          <c:x val="1.3218098627351297E-2"/>
+          <c:y val="0.12398523985239852"/>
+          <c:w val="0.97356380274529741"/>
+          <c:h val="0.75202952029520298"/>
+        </c:manualLayout>
+      </c:layout>
+      <c:barChart>
+        <c:barDir val="col"/>
+        <c:grouping val="stacked"/>
+        <c:varyColors val="0"/>
+        <c:ser>
+          <c:idx val="0"/>
+          <c:order val="0"/>
+          <c:tx>
+            <c:v>Revenue (m€)</c:v>
+          </c:tx>
+          <c:spPr>
+            <a:pattFill prst="narHorz">
+              <a:fgClr>
+                <a:schemeClr val="accent1"/>
+              </a:fgClr>
+              <a:bgClr>
+                <a:schemeClr val="accent1">
+                  <a:lumMod val="20000"/>
+                  <a:lumOff val="80000"/>
+                </a:schemeClr>
+              </a:bgClr>
+            </a:pattFill>
+            <a:ln>
+              <a:noFill/>
+            </a:ln>
+            <a:effectLst>
+              <a:innerShdw blurRad="114300">
+                <a:schemeClr val="accent1"/>
+              </a:innerShdw>
+            </a:effectLst>
+          </c:spPr>
+          <c:invertIfNegative val="0"/>
+          <c:dLbls>
+            <c:dLbl>
+              <c:idx val="0"/>
+              <c:layout>
+                <c:manualLayout>
+                  <c:x val="0"/>
+                  <c:y val="-6.1992619926199262E-2"/>
+                </c:manualLayout>
+              </c:layout>
+              <c:tx>
+                <c:rich>
+                  <a:bodyPr rot="0" spcFirstLastPara="1" vertOverflow="clip" horzOverflow="clip" vert="horz" wrap="square" lIns="38100" tIns="19050" rIns="38100" bIns="19050" anchor="ctr" anchorCtr="1">
+                    <a:spAutoFit/>
+                  </a:bodyPr>
+                  <a:lstStyle/>
+                  <a:p>
+                    <a:pPr>
+                      <a:defRPr sz="700" b="0" i="0" u="none" strike="noStrike" kern="1200" baseline="0">
+                        <a:solidFill>
+                          <a:schemeClr val="dk1">
+                            <a:lumMod val="65000"/>
+                            <a:lumOff val="35000"/>
+                          </a:schemeClr>
+                        </a:solidFill>
+                        <a:latin typeface="+mn-lt"/>
+                        <a:ea typeface="+mn-ea"/>
+                        <a:cs typeface="+mn-cs"/>
+                      </a:defRPr>
+                    </a:pPr>
+                    <a:r>
+                      <a:rPr lang="en-US"/>
+                      <a:t>1</a:t>
+                    </a:r>
+                  </a:p>
+                </c:rich>
+              </c:tx>
+              <c:numFmt formatCode="#,##0;&quot;-&quot;#,##0" sourceLinked="0"/>
+              <c:spPr>
+                <a:solidFill>
+                  <a:schemeClr val="lt1"/>
+                </a:solidFill>
+                <a:ln>
+                  <a:solidFill>
+                    <a:schemeClr val="dk1">
+                      <a:lumMod val="25000"/>
+                      <a:lumOff val="75000"/>
+                    </a:schemeClr>
+                  </a:solidFill>
+                </a:ln>
+                <a:effectLst/>
+              </c:spPr>
+              <c:txPr>
+                <a:bodyPr rot="0" spcFirstLastPara="1" vertOverflow="clip" horzOverflow="clip" vert="horz" wrap="square" lIns="38100" tIns="19050" rIns="38100" bIns="19050" anchor="ctr" anchorCtr="1">
+                  <a:spAutoFit/>
+                </a:bodyPr>
+                <a:lstStyle/>
+                <a:p>
+                  <a:pPr>
+                    <a:defRPr sz="700" b="0" i="0" u="none" strike="noStrike" kern="1200" baseline="0">
+                      <a:solidFill>
+                        <a:schemeClr val="dk1">
+                          <a:lumMod val="65000"/>
+                          <a:lumOff val="35000"/>
+                        </a:schemeClr>
+                      </a:solidFill>
+                      <a:latin typeface="+mn-lt"/>
+                      <a:ea typeface="+mn-ea"/>
+                      <a:cs typeface="+mn-cs"/>
+                    </a:defRPr>
+                  </a:pPr>
+                  <a:endParaRPr lang="it-IT"/>
+                </a:p>
+              </c:txPr>
+              <c:dLblPos val="ctr"/>
+              <c:showLegendKey val="0"/>
+              <c:showVal val="1"/>
+              <c:showCatName val="0"/>
+              <c:showSerName val="0"/>
+              <c:showPercent val="0"/>
+              <c:showBubbleSize val="0"/>
+              <c:extLst>
+                <c:ext xmlns:c15="http://schemas.microsoft.com/office/drawing/2012/chart" uri="{CE6537A1-D6FC-4f65-9D91-7224C49458BB}">
+                  <c15:spPr xmlns:c15="http://schemas.microsoft.com/office/drawing/2012/chart">
+                    <a:prstGeom prst="rect">
+                      <a:avLst/>
+                    </a:prstGeom>
+                    <a:noFill/>
+                    <a:ln>
+                      <a:noFill/>
+                    </a:ln>
+                  </c15:spPr>
+                  <c15:showDataLabelsRange val="0"/>
+                </c:ext>
+                <c:ext xmlns:c16="http://schemas.microsoft.com/office/drawing/2014/chart" uri="{C3380CC4-5D6E-409C-BE32-E72D297353CC}">
+                  <c16:uniqueId val="{00000000-11B0-445A-96A1-F827D5FC7714}"/>
+                </c:ext>
+              </c:extLst>
+            </c:dLbl>
+            <c:dLbl>
+              <c:idx val="1"/>
+              <c:layout>
+                <c:manualLayout>
+                  <c:x val="0"/>
+                  <c:y val="-2.9520295202952029E-3"/>
+                </c:manualLayout>
+              </c:layout>
+              <c:tx>
+                <c:rich>
+                  <a:bodyPr rot="0" spcFirstLastPara="1" vertOverflow="clip" horzOverflow="clip" vert="horz" wrap="square" lIns="38100" tIns="19050" rIns="38100" bIns="19050" anchor="ctr" anchorCtr="1">
+                    <a:spAutoFit/>
+                  </a:bodyPr>
+                  <a:lstStyle/>
+                  <a:p>
+                    <a:pPr>
+                      <a:defRPr sz="700" b="0" i="0" u="none" strike="noStrike" kern="1200" baseline="0">
+                        <a:solidFill>
+                          <a:schemeClr val="dk1">
+                            <a:lumMod val="65000"/>
+                            <a:lumOff val="35000"/>
+                          </a:schemeClr>
+                        </a:solidFill>
+                        <a:latin typeface="+mn-lt"/>
+                        <a:ea typeface="+mn-ea"/>
+                        <a:cs typeface="+mn-cs"/>
+                      </a:defRPr>
+                    </a:pPr>
+                    <a:r>
+                      <a:rPr lang="en-US"/>
+                      <a:t>20</a:t>
+                    </a:r>
+                  </a:p>
+                </c:rich>
+              </c:tx>
+              <c:numFmt formatCode="#,##0;&quot;-&quot;#,##0" sourceLinked="0"/>
+              <c:spPr>
+                <a:solidFill>
+                  <a:schemeClr val="lt1"/>
+                </a:solidFill>
+                <a:ln>
+                  <a:solidFill>
+                    <a:schemeClr val="dk1">
+                      <a:lumMod val="25000"/>
+                      <a:lumOff val="75000"/>
+                    </a:schemeClr>
+                  </a:solidFill>
+                </a:ln>
+                <a:effectLst/>
+              </c:spPr>
+              <c:txPr>
+                <a:bodyPr rot="0" spcFirstLastPara="1" vertOverflow="clip" horzOverflow="clip" vert="horz" wrap="square" lIns="38100" tIns="19050" rIns="38100" bIns="19050" anchor="ctr" anchorCtr="1">
+                  <a:spAutoFit/>
+                </a:bodyPr>
+                <a:lstStyle/>
+                <a:p>
+                  <a:pPr>
+                    <a:defRPr sz="700" b="0" i="0" u="none" strike="noStrike" kern="1200" baseline="0">
+                      <a:solidFill>
+                        <a:schemeClr val="dk1">
+                          <a:lumMod val="65000"/>
+                          <a:lumOff val="35000"/>
+                        </a:schemeClr>
+                      </a:solidFill>
+                      <a:latin typeface="+mn-lt"/>
+                      <a:ea typeface="+mn-ea"/>
+                      <a:cs typeface="+mn-cs"/>
+                    </a:defRPr>
+                  </a:pPr>
+                  <a:endParaRPr lang="it-IT"/>
+                </a:p>
+              </c:txPr>
+              <c:dLblPos val="ctr"/>
+              <c:showLegendKey val="0"/>
+              <c:showVal val="1"/>
+              <c:showCatName val="0"/>
+              <c:showSerName val="0"/>
+              <c:showPercent val="0"/>
+              <c:showBubbleSize val="0"/>
+              <c:extLst>
+                <c:ext xmlns:c15="http://schemas.microsoft.com/office/drawing/2012/chart" uri="{CE6537A1-D6FC-4f65-9D91-7224C49458BB}">
+                  <c15:spPr xmlns:c15="http://schemas.microsoft.com/office/drawing/2012/chart">
+                    <a:prstGeom prst="rect">
+                      <a:avLst/>
+                    </a:prstGeom>
+                    <a:noFill/>
+                    <a:ln>
+                      <a:noFill/>
+                    </a:ln>
+                  </c15:spPr>
+                  <c15:showDataLabelsRange val="0"/>
+                </c:ext>
+                <c:ext xmlns:c16="http://schemas.microsoft.com/office/drawing/2014/chart" uri="{C3380CC4-5D6E-409C-BE32-E72D297353CC}">
+                  <c16:uniqueId val="{00000001-11B0-445A-96A1-F827D5FC7714}"/>
+                </c:ext>
+              </c:extLst>
+            </c:dLbl>
+            <c:dLbl>
+              <c:idx val="2"/>
+              <c:layout>
+                <c:manualLayout>
+                  <c:x val="0"/>
+                  <c:y val="-2.2140221402214021E-3"/>
+                </c:manualLayout>
+              </c:layout>
+              <c:tx>
+                <c:rich>
+                  <a:bodyPr rot="0" spcFirstLastPara="1" vertOverflow="clip" horzOverflow="clip" vert="horz" wrap="square" lIns="38100" tIns="19050" rIns="38100" bIns="19050" anchor="ctr" anchorCtr="1">
+                    <a:spAutoFit/>
+                  </a:bodyPr>
+                  <a:lstStyle/>
+                  <a:p>
+                    <a:pPr>
+                      <a:defRPr sz="700" b="0" i="0" u="none" strike="noStrike" kern="1200" baseline="0">
+                        <a:solidFill>
+                          <a:schemeClr val="dk1">
+                            <a:lumMod val="65000"/>
+                            <a:lumOff val="35000"/>
+                          </a:schemeClr>
+                        </a:solidFill>
+                        <a:latin typeface="+mn-lt"/>
+                        <a:ea typeface="+mn-ea"/>
+                        <a:cs typeface="+mn-cs"/>
+                      </a:defRPr>
+                    </a:pPr>
+                    <a:r>
+                      <a:rPr lang="en-US"/>
+                      <a:t>30</a:t>
+                    </a:r>
+                  </a:p>
+                </c:rich>
+              </c:tx>
+              <c:numFmt formatCode="#,##0;&quot;-&quot;#,##0" sourceLinked="0"/>
+              <c:spPr>
+                <a:solidFill>
+                  <a:schemeClr val="lt1"/>
+                </a:solidFill>
+                <a:ln>
+                  <a:solidFill>
+                    <a:schemeClr val="dk1">
+                      <a:lumMod val="25000"/>
+                      <a:lumOff val="75000"/>
+                    </a:schemeClr>
+                  </a:solidFill>
+                </a:ln>
+                <a:effectLst/>
+              </c:spPr>
+              <c:txPr>
+                <a:bodyPr rot="0" spcFirstLastPara="1" vertOverflow="clip" horzOverflow="clip" vert="horz" wrap="square" lIns="38100" tIns="19050" rIns="38100" bIns="19050" anchor="ctr" anchorCtr="1">
+                  <a:spAutoFit/>
+                </a:bodyPr>
+                <a:lstStyle/>
+                <a:p>
+                  <a:pPr>
+                    <a:defRPr sz="700" b="0" i="0" u="none" strike="noStrike" kern="1200" baseline="0">
+                      <a:solidFill>
+                        <a:schemeClr val="dk1">
+                          <a:lumMod val="65000"/>
+                          <a:lumOff val="35000"/>
+                        </a:schemeClr>
+                      </a:solidFill>
+                      <a:latin typeface="+mn-lt"/>
+                      <a:ea typeface="+mn-ea"/>
+                      <a:cs typeface="+mn-cs"/>
+                    </a:defRPr>
+                  </a:pPr>
+                  <a:endParaRPr lang="it-IT"/>
+                </a:p>
+              </c:txPr>
+              <c:dLblPos val="ctr"/>
+              <c:showLegendKey val="0"/>
+              <c:showVal val="1"/>
+              <c:showCatName val="0"/>
+              <c:showSerName val="0"/>
+              <c:showPercent val="0"/>
+              <c:showBubbleSize val="0"/>
+              <c:extLst>
+                <c:ext xmlns:c15="http://schemas.microsoft.com/office/drawing/2012/chart" uri="{CE6537A1-D6FC-4f65-9D91-7224C49458BB}">
+                  <c15:spPr xmlns:c15="http://schemas.microsoft.com/office/drawing/2012/chart">
+                    <a:prstGeom prst="rect">
+                      <a:avLst/>
+                    </a:prstGeom>
+                    <a:noFill/>
+                    <a:ln>
+                      <a:noFill/>
+                    </a:ln>
+                  </c15:spPr>
+                  <c15:showDataLabelsRange val="0"/>
+                </c:ext>
+                <c:ext xmlns:c16="http://schemas.microsoft.com/office/drawing/2014/chart" uri="{C3380CC4-5D6E-409C-BE32-E72D297353CC}">
+                  <c16:uniqueId val="{00000002-11B0-445A-96A1-F827D5FC7714}"/>
+                </c:ext>
+              </c:extLst>
+            </c:dLbl>
+            <c:dLbl>
+              <c:idx val="3"/>
+              <c:layout>
+                <c:manualLayout>
+                  <c:x val="0"/>
+                  <c:y val="-2.9520295202952029E-3"/>
+                </c:manualLayout>
+              </c:layout>
+              <c:tx>
+                <c:rich>
+                  <a:bodyPr rot="0" spcFirstLastPara="1" vertOverflow="clip" horzOverflow="clip" vert="horz" wrap="square" lIns="38100" tIns="19050" rIns="38100" bIns="19050" anchor="ctr" anchorCtr="1">
+                    <a:spAutoFit/>
+                  </a:bodyPr>
+                  <a:lstStyle/>
+                  <a:p>
+                    <a:pPr>
+                      <a:defRPr sz="700" b="0" i="0" u="none" strike="noStrike" kern="1200" baseline="0">
+                        <a:solidFill>
+                          <a:schemeClr val="dk1">
+                            <a:lumMod val="65000"/>
+                            <a:lumOff val="35000"/>
+                          </a:schemeClr>
+                        </a:solidFill>
+                        <a:latin typeface="+mn-lt"/>
+                        <a:ea typeface="+mn-ea"/>
+                        <a:cs typeface="+mn-cs"/>
+                      </a:defRPr>
+                    </a:pPr>
+                    <a:r>
+                      <a:rPr lang="en-US"/>
+                      <a:t>35</a:t>
+                    </a:r>
+                  </a:p>
+                </c:rich>
+              </c:tx>
+              <c:numFmt formatCode="#,##0;&quot;-&quot;#,##0" sourceLinked="0"/>
+              <c:spPr>
+                <a:solidFill>
+                  <a:schemeClr val="lt1"/>
+                </a:solidFill>
+                <a:ln>
+                  <a:solidFill>
+                    <a:schemeClr val="dk1">
+                      <a:lumMod val="25000"/>
+                      <a:lumOff val="75000"/>
+                    </a:schemeClr>
+                  </a:solidFill>
+                </a:ln>
+                <a:effectLst/>
+              </c:spPr>
+              <c:txPr>
+                <a:bodyPr rot="0" spcFirstLastPara="1" vertOverflow="clip" horzOverflow="clip" vert="horz" wrap="square" lIns="38100" tIns="19050" rIns="38100" bIns="19050" anchor="ctr" anchorCtr="1">
+                  <a:spAutoFit/>
+                </a:bodyPr>
+                <a:lstStyle/>
+                <a:p>
+                  <a:pPr>
+                    <a:defRPr sz="700" b="0" i="0" u="none" strike="noStrike" kern="1200" baseline="0">
+                      <a:solidFill>
+                        <a:schemeClr val="dk1">
+                          <a:lumMod val="65000"/>
+                          <a:lumOff val="35000"/>
+                        </a:schemeClr>
+                      </a:solidFill>
+                      <a:latin typeface="+mn-lt"/>
+                      <a:ea typeface="+mn-ea"/>
+                      <a:cs typeface="+mn-cs"/>
+                    </a:defRPr>
+                  </a:pPr>
+                  <a:endParaRPr lang="it-IT"/>
+                </a:p>
+              </c:txPr>
+              <c:dLblPos val="ctr"/>
+              <c:showLegendKey val="0"/>
+              <c:showVal val="1"/>
+              <c:showCatName val="0"/>
+              <c:showSerName val="0"/>
+              <c:showPercent val="0"/>
+              <c:showBubbleSize val="0"/>
+              <c:extLst>
+                <c:ext xmlns:c15="http://schemas.microsoft.com/office/drawing/2012/chart" uri="{CE6537A1-D6FC-4f65-9D91-7224C49458BB}">
+                  <c15:spPr xmlns:c15="http://schemas.microsoft.com/office/drawing/2012/chart">
+                    <a:prstGeom prst="rect">
+                      <a:avLst/>
+                    </a:prstGeom>
+                    <a:noFill/>
+                    <a:ln>
+                      <a:noFill/>
+                    </a:ln>
+                  </c15:spPr>
+                  <c15:showDataLabelsRange val="0"/>
+                </c:ext>
+                <c:ext xmlns:c16="http://schemas.microsoft.com/office/drawing/2014/chart" uri="{C3380CC4-5D6E-409C-BE32-E72D297353CC}">
+                  <c16:uniqueId val="{00000003-11B0-445A-96A1-F827D5FC7714}"/>
+                </c:ext>
+              </c:extLst>
+            </c:dLbl>
+            <c:dLbl>
+              <c:idx val="4"/>
+              <c:layout>
+                <c:manualLayout>
+                  <c:x val="0"/>
+                  <c:y val="-2.2140221402214021E-3"/>
+                </c:manualLayout>
+              </c:layout>
+              <c:tx>
+                <c:rich>
+                  <a:bodyPr rot="0" spcFirstLastPara="1" vertOverflow="clip" horzOverflow="clip" vert="horz" wrap="square" lIns="38100" tIns="19050" rIns="38100" bIns="19050" anchor="ctr" anchorCtr="1">
+                    <a:spAutoFit/>
+                  </a:bodyPr>
+                  <a:lstStyle/>
+                  <a:p>
+                    <a:pPr>
+                      <a:defRPr sz="700" b="0" i="0" u="none" strike="noStrike" kern="1200" baseline="0">
+                        <a:solidFill>
+                          <a:schemeClr val="dk1">
+                            <a:lumMod val="65000"/>
+                            <a:lumOff val="35000"/>
+                          </a:schemeClr>
+                        </a:solidFill>
+                        <a:latin typeface="+mn-lt"/>
+                        <a:ea typeface="+mn-ea"/>
+                        <a:cs typeface="+mn-cs"/>
+                      </a:defRPr>
+                    </a:pPr>
+                    <a:r>
+                      <a:rPr lang="en-US"/>
+                      <a:t>38</a:t>
+                    </a:r>
+                  </a:p>
+                </c:rich>
+              </c:tx>
+              <c:numFmt formatCode="#,##0;&quot;-&quot;#,##0" sourceLinked="0"/>
+              <c:spPr>
+                <a:solidFill>
+                  <a:schemeClr val="lt1"/>
+                </a:solidFill>
+                <a:ln>
+                  <a:solidFill>
+                    <a:schemeClr val="dk1">
+                      <a:lumMod val="25000"/>
+                      <a:lumOff val="75000"/>
+                    </a:schemeClr>
+                  </a:solidFill>
+                </a:ln>
+                <a:effectLst/>
+              </c:spPr>
+              <c:txPr>
+                <a:bodyPr rot="0" spcFirstLastPara="1" vertOverflow="clip" horzOverflow="clip" vert="horz" wrap="square" lIns="38100" tIns="19050" rIns="38100" bIns="19050" anchor="ctr" anchorCtr="1">
+                  <a:spAutoFit/>
+                </a:bodyPr>
+                <a:lstStyle/>
+                <a:p>
+                  <a:pPr>
+                    <a:defRPr sz="700" b="0" i="0" u="none" strike="noStrike" kern="1200" baseline="0">
+                      <a:solidFill>
+                        <a:schemeClr val="dk1">
+                          <a:lumMod val="65000"/>
+                          <a:lumOff val="35000"/>
+                        </a:schemeClr>
+                      </a:solidFill>
+                      <a:latin typeface="+mn-lt"/>
+                      <a:ea typeface="+mn-ea"/>
+                      <a:cs typeface="+mn-cs"/>
+                    </a:defRPr>
+                  </a:pPr>
+                  <a:endParaRPr lang="it-IT"/>
+                </a:p>
+              </c:txPr>
+              <c:dLblPos val="ctr"/>
+              <c:showLegendKey val="0"/>
+              <c:showVal val="1"/>
+              <c:showCatName val="0"/>
+              <c:showSerName val="0"/>
+              <c:showPercent val="0"/>
+              <c:showBubbleSize val="0"/>
+              <c:extLst>
+                <c:ext xmlns:c15="http://schemas.microsoft.com/office/drawing/2012/chart" uri="{CE6537A1-D6FC-4f65-9D91-7224C49458BB}">
+                  <c15:spPr xmlns:c15="http://schemas.microsoft.com/office/drawing/2012/chart">
+                    <a:prstGeom prst="rect">
+                      <a:avLst/>
+                    </a:prstGeom>
+                    <a:noFill/>
+                    <a:ln>
+                      <a:noFill/>
+                    </a:ln>
+                  </c15:spPr>
+                  <c15:showDataLabelsRange val="0"/>
+                </c:ext>
+                <c:ext xmlns:c16="http://schemas.microsoft.com/office/drawing/2014/chart" uri="{C3380CC4-5D6E-409C-BE32-E72D297353CC}">
+                  <c16:uniqueId val="{00000004-11B0-445A-96A1-F827D5FC7714}"/>
+                </c:ext>
+              </c:extLst>
+            </c:dLbl>
+            <c:dLbl>
+              <c:idx val="5"/>
+              <c:layout>
+                <c:manualLayout>
+                  <c:x val="0"/>
+                  <c:y val="-2.2140221402214021E-3"/>
+                </c:manualLayout>
+              </c:layout>
+              <c:tx>
+                <c:rich>
+                  <a:bodyPr rot="0" spcFirstLastPara="1" vertOverflow="clip" horzOverflow="clip" vert="horz" wrap="square" lIns="38100" tIns="19050" rIns="38100" bIns="19050" anchor="ctr" anchorCtr="1">
+                    <a:spAutoFit/>
+                  </a:bodyPr>
+                  <a:lstStyle/>
+                  <a:p>
+                    <a:pPr>
+                      <a:defRPr sz="700" b="0" i="0" u="none" strike="noStrike" kern="1200" baseline="0">
+                        <a:solidFill>
+                          <a:schemeClr val="dk1">
+                            <a:lumMod val="65000"/>
+                            <a:lumOff val="35000"/>
+                          </a:schemeClr>
+                        </a:solidFill>
+                        <a:latin typeface="+mn-lt"/>
+                        <a:ea typeface="+mn-ea"/>
+                        <a:cs typeface="+mn-cs"/>
+                      </a:defRPr>
+                    </a:pPr>
+                    <a:r>
+                      <a:rPr lang="en-US"/>
+                      <a:t>39</a:t>
+                    </a:r>
+                  </a:p>
+                </c:rich>
+              </c:tx>
+              <c:numFmt formatCode="#,##0;&quot;-&quot;#,##0" sourceLinked="0"/>
+              <c:spPr>
+                <a:solidFill>
+                  <a:schemeClr val="lt1"/>
+                </a:solidFill>
+                <a:ln>
+                  <a:solidFill>
+                    <a:schemeClr val="dk1">
+                      <a:lumMod val="25000"/>
+                      <a:lumOff val="75000"/>
+                    </a:schemeClr>
+                  </a:solidFill>
+                </a:ln>
+                <a:effectLst/>
+              </c:spPr>
+              <c:txPr>
+                <a:bodyPr rot="0" spcFirstLastPara="1" vertOverflow="clip" horzOverflow="clip" vert="horz" wrap="square" lIns="38100" tIns="19050" rIns="38100" bIns="19050" anchor="ctr" anchorCtr="1">
+                  <a:spAutoFit/>
+                </a:bodyPr>
+                <a:lstStyle/>
+                <a:p>
+                  <a:pPr>
+                    <a:defRPr sz="700" b="0" i="0" u="none" strike="noStrike" kern="1200" baseline="0">
+                      <a:solidFill>
+                        <a:schemeClr val="dk1">
+                          <a:lumMod val="65000"/>
+                          <a:lumOff val="35000"/>
+                        </a:schemeClr>
+                      </a:solidFill>
+                      <a:latin typeface="+mn-lt"/>
+                      <a:ea typeface="+mn-ea"/>
+                      <a:cs typeface="+mn-cs"/>
+                    </a:defRPr>
+                  </a:pPr>
+                  <a:endParaRPr lang="it-IT"/>
+                </a:p>
+              </c:txPr>
+              <c:dLblPos val="ctr"/>
+              <c:showLegendKey val="0"/>
+              <c:showVal val="1"/>
+              <c:showCatName val="0"/>
+              <c:showSerName val="0"/>
+              <c:showPercent val="0"/>
+              <c:showBubbleSize val="0"/>
+              <c:extLst>
+                <c:ext xmlns:c15="http://schemas.microsoft.com/office/drawing/2012/chart" uri="{CE6537A1-D6FC-4f65-9D91-7224C49458BB}">
+                  <c15:spPr xmlns:c15="http://schemas.microsoft.com/office/drawing/2012/chart">
+                    <a:prstGeom prst="rect">
+                      <a:avLst/>
+                    </a:prstGeom>
+                    <a:noFill/>
+                    <a:ln>
+                      <a:noFill/>
+                    </a:ln>
+                  </c15:spPr>
+                  <c15:showDataLabelsRange val="0"/>
+                </c:ext>
+                <c:ext xmlns:c16="http://schemas.microsoft.com/office/drawing/2014/chart" uri="{C3380CC4-5D6E-409C-BE32-E72D297353CC}">
+                  <c16:uniqueId val="{00000005-11B0-445A-96A1-F827D5FC7714}"/>
+                </c:ext>
+              </c:extLst>
+            </c:dLbl>
+            <c:dLbl>
+              <c:idx val="6"/>
+              <c:layout>
+                <c:manualLayout>
+                  <c:x val="0"/>
+                  <c:y val="-2.2140221402214021E-3"/>
+                </c:manualLayout>
+              </c:layout>
+              <c:tx>
+                <c:rich>
+                  <a:bodyPr rot="0" spcFirstLastPara="1" vertOverflow="clip" horzOverflow="clip" vert="horz" wrap="square" lIns="38100" tIns="19050" rIns="38100" bIns="19050" anchor="ctr" anchorCtr="1">
+                    <a:spAutoFit/>
+                  </a:bodyPr>
+                  <a:lstStyle/>
+                  <a:p>
+                    <a:pPr>
+                      <a:defRPr sz="700" b="0" i="0" u="none" strike="noStrike" kern="1200" baseline="0">
+                        <a:solidFill>
+                          <a:schemeClr val="dk1">
+                            <a:lumMod val="65000"/>
+                            <a:lumOff val="35000"/>
+                          </a:schemeClr>
+                        </a:solidFill>
+                        <a:latin typeface="+mn-lt"/>
+                        <a:ea typeface="+mn-ea"/>
+                        <a:cs typeface="+mn-cs"/>
+                      </a:defRPr>
+                    </a:pPr>
+                    <a:r>
+                      <a:rPr lang="en-US"/>
+                      <a:t>38</a:t>
+                    </a:r>
+                  </a:p>
+                </c:rich>
+              </c:tx>
+              <c:numFmt formatCode="#,##0;&quot;-&quot;#,##0" sourceLinked="0"/>
+              <c:spPr>
+                <a:solidFill>
+                  <a:schemeClr val="lt1"/>
+                </a:solidFill>
+                <a:ln>
+                  <a:solidFill>
+                    <a:schemeClr val="dk1">
+                      <a:lumMod val="25000"/>
+                      <a:lumOff val="75000"/>
+                    </a:schemeClr>
+                  </a:solidFill>
+                </a:ln>
+                <a:effectLst/>
+              </c:spPr>
+              <c:txPr>
+                <a:bodyPr rot="0" spcFirstLastPara="1" vertOverflow="clip" horzOverflow="clip" vert="horz" wrap="square" lIns="38100" tIns="19050" rIns="38100" bIns="19050" anchor="ctr" anchorCtr="1">
+                  <a:spAutoFit/>
+                </a:bodyPr>
+                <a:lstStyle/>
+                <a:p>
+                  <a:pPr>
+                    <a:defRPr sz="700" b="0" i="0" u="none" strike="noStrike" kern="1200" baseline="0">
+                      <a:solidFill>
+                        <a:schemeClr val="dk1">
+                          <a:lumMod val="65000"/>
+                          <a:lumOff val="35000"/>
+                        </a:schemeClr>
+                      </a:solidFill>
+                      <a:latin typeface="+mn-lt"/>
+                      <a:ea typeface="+mn-ea"/>
+                      <a:cs typeface="+mn-cs"/>
+                    </a:defRPr>
+                  </a:pPr>
+                  <a:endParaRPr lang="it-IT"/>
+                </a:p>
+              </c:txPr>
+              <c:dLblPos val="ctr"/>
+              <c:showLegendKey val="0"/>
+              <c:showVal val="1"/>
+              <c:showCatName val="0"/>
+              <c:showSerName val="0"/>
+              <c:showPercent val="0"/>
+              <c:showBubbleSize val="0"/>
+              <c:extLst>
+                <c:ext xmlns:c15="http://schemas.microsoft.com/office/drawing/2012/chart" uri="{CE6537A1-D6FC-4f65-9D91-7224C49458BB}">
+                  <c15:spPr xmlns:c15="http://schemas.microsoft.com/office/drawing/2012/chart">
+                    <a:prstGeom prst="rect">
+                      <a:avLst/>
+                    </a:prstGeom>
+                    <a:noFill/>
+                    <a:ln>
+                      <a:noFill/>
+                    </a:ln>
+                  </c15:spPr>
+                  <c15:showDataLabelsRange val="0"/>
+                </c:ext>
+                <c:ext xmlns:c16="http://schemas.microsoft.com/office/drawing/2014/chart" uri="{C3380CC4-5D6E-409C-BE32-E72D297353CC}">
+                  <c16:uniqueId val="{00000006-11B0-445A-96A1-F827D5FC7714}"/>
+                </c:ext>
+              </c:extLst>
+            </c:dLbl>
+            <c:dLbl>
+              <c:idx val="7"/>
+              <c:layout>
+                <c:manualLayout>
+                  <c:x val="0"/>
+                  <c:y val="-2.2140221402214021E-3"/>
+                </c:manualLayout>
+              </c:layout>
+              <c:tx>
+                <c:rich>
+                  <a:bodyPr rot="0" spcFirstLastPara="1" vertOverflow="clip" horzOverflow="clip" vert="horz" wrap="square" lIns="38100" tIns="19050" rIns="38100" bIns="19050" anchor="ctr" anchorCtr="1">
+                    <a:spAutoFit/>
+                  </a:bodyPr>
+                  <a:lstStyle/>
+                  <a:p>
+                    <a:pPr>
+                      <a:defRPr sz="700" b="0" i="0" u="none" strike="noStrike" kern="1200" baseline="0">
+                        <a:solidFill>
+                          <a:schemeClr val="dk1">
+                            <a:lumMod val="65000"/>
+                            <a:lumOff val="35000"/>
+                          </a:schemeClr>
+                        </a:solidFill>
+                        <a:latin typeface="+mn-lt"/>
+                        <a:ea typeface="+mn-ea"/>
+                        <a:cs typeface="+mn-cs"/>
+                      </a:defRPr>
+                    </a:pPr>
+                    <a:r>
+                      <a:rPr lang="en-US"/>
+                      <a:t>40</a:t>
+                    </a:r>
+                  </a:p>
+                </c:rich>
+              </c:tx>
+              <c:numFmt formatCode="#,##0;&quot;-&quot;#,##0" sourceLinked="0"/>
+              <c:spPr>
+                <a:solidFill>
+                  <a:schemeClr val="lt1"/>
+                </a:solidFill>
+                <a:ln>
+                  <a:solidFill>
+                    <a:schemeClr val="dk1">
+                      <a:lumMod val="25000"/>
+                      <a:lumOff val="75000"/>
+                    </a:schemeClr>
+                  </a:solidFill>
+                </a:ln>
+                <a:effectLst/>
+              </c:spPr>
+              <c:txPr>
+                <a:bodyPr rot="0" spcFirstLastPara="1" vertOverflow="clip" horzOverflow="clip" vert="horz" wrap="square" lIns="38100" tIns="19050" rIns="38100" bIns="19050" anchor="ctr" anchorCtr="1">
+                  <a:spAutoFit/>
+                </a:bodyPr>
+                <a:lstStyle/>
+                <a:p>
+                  <a:pPr>
+                    <a:defRPr sz="700" b="0" i="0" u="none" strike="noStrike" kern="1200" baseline="0">
+                      <a:solidFill>
+                        <a:schemeClr val="dk1">
+                          <a:lumMod val="65000"/>
+                          <a:lumOff val="35000"/>
+                        </a:schemeClr>
+                      </a:solidFill>
+                      <a:latin typeface="+mn-lt"/>
+                      <a:ea typeface="+mn-ea"/>
+                      <a:cs typeface="+mn-cs"/>
+                    </a:defRPr>
+                  </a:pPr>
+                  <a:endParaRPr lang="it-IT"/>
+                </a:p>
+              </c:txPr>
+              <c:dLblPos val="ctr"/>
+              <c:showLegendKey val="0"/>
+              <c:showVal val="1"/>
+              <c:showCatName val="0"/>
+              <c:showSerName val="0"/>
+              <c:showPercent val="0"/>
+              <c:showBubbleSize val="0"/>
+              <c:extLst>
+                <c:ext xmlns:c15="http://schemas.microsoft.com/office/drawing/2012/chart" uri="{CE6537A1-D6FC-4f65-9D91-7224C49458BB}">
+                  <c15:spPr xmlns:c15="http://schemas.microsoft.com/office/drawing/2012/chart">
+                    <a:prstGeom prst="rect">
+                      <a:avLst/>
+                    </a:prstGeom>
+                    <a:noFill/>
+                    <a:ln>
+                      <a:noFill/>
+                    </a:ln>
+                  </c15:spPr>
+                  <c15:showDataLabelsRange val="0"/>
+                </c:ext>
+                <c:ext xmlns:c16="http://schemas.microsoft.com/office/drawing/2014/chart" uri="{C3380CC4-5D6E-409C-BE32-E72D297353CC}">
+                  <c16:uniqueId val="{00000007-11B0-445A-96A1-F827D5FC7714}"/>
+                </c:ext>
+              </c:extLst>
+            </c:dLbl>
+            <c:dLbl>
+              <c:idx val="8"/>
+              <c:layout>
+                <c:manualLayout>
+                  <c:x val="0"/>
+                  <c:y val="-2.9520295202952029E-3"/>
+                </c:manualLayout>
+              </c:layout>
+              <c:tx>
+                <c:rich>
+                  <a:bodyPr rot="0" spcFirstLastPara="1" vertOverflow="clip" horzOverflow="clip" vert="horz" wrap="square" lIns="38100" tIns="19050" rIns="38100" bIns="19050" anchor="ctr" anchorCtr="1">
+                    <a:spAutoFit/>
+                  </a:bodyPr>
+                  <a:lstStyle/>
+                  <a:p>
+                    <a:pPr>
+                      <a:defRPr sz="700" b="0" i="0" u="none" strike="noStrike" kern="1200" baseline="0">
+                        <a:solidFill>
+                          <a:schemeClr val="dk1">
+                            <a:lumMod val="65000"/>
+                            <a:lumOff val="35000"/>
+                          </a:schemeClr>
+                        </a:solidFill>
+                        <a:latin typeface="+mn-lt"/>
+                        <a:ea typeface="+mn-ea"/>
+                        <a:cs typeface="+mn-cs"/>
+                      </a:defRPr>
+                    </a:pPr>
+                    <a:r>
+                      <a:rPr lang="en-US"/>
+                      <a:t>60</a:t>
+                    </a:r>
+                  </a:p>
+                </c:rich>
+              </c:tx>
+              <c:numFmt formatCode="#,##0;&quot;-&quot;#,##0" sourceLinked="0"/>
+              <c:spPr>
+                <a:solidFill>
+                  <a:schemeClr val="lt1"/>
+                </a:solidFill>
+                <a:ln>
+                  <a:solidFill>
+                    <a:schemeClr val="dk1">
+                      <a:lumMod val="25000"/>
+                      <a:lumOff val="75000"/>
+                    </a:schemeClr>
+                  </a:solidFill>
+                </a:ln>
+                <a:effectLst/>
+              </c:spPr>
+              <c:txPr>
+                <a:bodyPr rot="0" spcFirstLastPara="1" vertOverflow="clip" horzOverflow="clip" vert="horz" wrap="square" lIns="38100" tIns="19050" rIns="38100" bIns="19050" anchor="ctr" anchorCtr="1">
+                  <a:spAutoFit/>
+                </a:bodyPr>
+                <a:lstStyle/>
+                <a:p>
+                  <a:pPr>
+                    <a:defRPr sz="700" b="0" i="0" u="none" strike="noStrike" kern="1200" baseline="0">
+                      <a:solidFill>
+                        <a:schemeClr val="dk1">
+                          <a:lumMod val="65000"/>
+                          <a:lumOff val="35000"/>
+                        </a:schemeClr>
+                      </a:solidFill>
+                      <a:latin typeface="+mn-lt"/>
+                      <a:ea typeface="+mn-ea"/>
+                      <a:cs typeface="+mn-cs"/>
+                    </a:defRPr>
+                  </a:pPr>
+                  <a:endParaRPr lang="it-IT"/>
+                </a:p>
+              </c:txPr>
+              <c:dLblPos val="ctr"/>
+              <c:showLegendKey val="0"/>
+              <c:showVal val="1"/>
+              <c:showCatName val="0"/>
+              <c:showSerName val="0"/>
+              <c:showPercent val="0"/>
+              <c:showBubbleSize val="0"/>
+              <c:extLst>
+                <c:ext xmlns:c15="http://schemas.microsoft.com/office/drawing/2012/chart" uri="{CE6537A1-D6FC-4f65-9D91-7224C49458BB}">
+                  <c15:spPr xmlns:c15="http://schemas.microsoft.com/office/drawing/2012/chart">
+                    <a:prstGeom prst="rect">
+                      <a:avLst/>
+                    </a:prstGeom>
+                    <a:noFill/>
+                    <a:ln>
+                      <a:noFill/>
+                    </a:ln>
+                  </c15:spPr>
+                  <c15:showDataLabelsRange val="0"/>
+                </c:ext>
+                <c:ext xmlns:c16="http://schemas.microsoft.com/office/drawing/2014/chart" uri="{C3380CC4-5D6E-409C-BE32-E72D297353CC}">
+                  <c16:uniqueId val="{00000008-11B0-445A-96A1-F827D5FC7714}"/>
+                </c:ext>
+              </c:extLst>
+            </c:dLbl>
+            <c:spPr>
+              <a:noFill/>
+              <a:ln>
+                <a:noFill/>
+              </a:ln>
+              <a:effectLst/>
+            </c:spPr>
+            <c:txPr>
+              <a:bodyPr rot="0" spcFirstLastPara="1" vertOverflow="ellipsis" vert="horz" wrap="square" lIns="38100" tIns="19050" rIns="38100" bIns="19050" anchor="ctr" anchorCtr="1">
+                <a:spAutoFit/>
+              </a:bodyPr>
+              <a:lstStyle/>
+              <a:p>
+                <a:pPr>
+                  <a:defRPr sz="700" b="0" i="0" u="none" strike="noStrike" kern="1200" baseline="0">
+                    <a:solidFill>
+                      <a:schemeClr val="tx1">
+                        <a:lumMod val="75000"/>
+                        <a:lumOff val="25000"/>
+                      </a:schemeClr>
+                    </a:solidFill>
+                    <a:latin typeface="+mn-lt"/>
+                    <a:ea typeface="+mn-ea"/>
+                    <a:cs typeface="+mn-cs"/>
+                  </a:defRPr>
+                </a:pPr>
+                <a:endParaRPr lang="it-IT"/>
+              </a:p>
+            </c:txPr>
+            <c:showLegendKey val="0"/>
+            <c:showVal val="0"/>
+            <c:showCatName val="0"/>
+            <c:showSerName val="0"/>
+            <c:showPercent val="0"/>
+            <c:showBubbleSize val="0"/>
+            <c:extLst>
+              <c:ext xmlns:c15="http://schemas.microsoft.com/office/drawing/2012/chart" uri="{CE6537A1-D6FC-4f65-9D91-7224C49458BB}">
+                <c15:showLeaderLines val="0"/>
+              </c:ext>
+            </c:extLst>
+          </c:dLbls>
+          <c:val>
+            <c:numRef>
+              <c:f>Sheet1!$A$1:$I$1</c:f>
+              <c:numCache>
+                <c:formatCode>#,##0;"-"#,##0</c:formatCode>
+                <c:ptCount val="9"/>
+                <c:pt idx="0">
+                  <c:v>2.77402039</c:v>
+                </c:pt>
+                <c:pt idx="1">
+                  <c:v>39.21340326</c:v>
+                </c:pt>
+                <c:pt idx="2">
+                  <c:v>59.309347410000001</c:v>
+                </c:pt>
+                <c:pt idx="3">
+                  <c:v>70.063966500000006</c:v>
+                </c:pt>
+                <c:pt idx="4">
+                  <c:v>74.798167000000007</c:v>
+                </c:pt>
+                <c:pt idx="5">
+                  <c:v>77.744223730000002</c:v>
+                </c:pt>
+                <c:pt idx="6">
+                  <c:v>75.108711780000021</c:v>
+                </c:pt>
+                <c:pt idx="7">
+                  <c:v>78.900000000000006</c:v>
+                </c:pt>
+                <c:pt idx="8">
+                  <c:v>1000</c:v>
+                </c:pt>
+              </c:numCache>
+            </c:numRef>
+          </c:val>
+          <c:extLst>
+            <c:ext xmlns:c16="http://schemas.microsoft.com/office/drawing/2014/chart" uri="{C3380CC4-5D6E-409C-BE32-E72D297353CC}">
+              <c16:uniqueId val="{00000009-11B0-445A-96A1-F827D5FC7714}"/>
+            </c:ext>
+          </c:extLst>
+        </c:ser>
+        <c:dLbls>
+          <c:showLegendKey val="0"/>
+          <c:showVal val="0"/>
+          <c:showCatName val="0"/>
+          <c:showSerName val="0"/>
+          <c:showPercent val="0"/>
+          <c:showBubbleSize val="0"/>
+        </c:dLbls>
+        <c:gapWidth val="247"/>
+        <c:overlap val="100"/>
+        <c:axId val="57061936"/>
+        <c:axId val="1"/>
+      </c:barChart>
+      <c:lineChart>
+        <c:grouping val="standard"/>
+        <c:varyColors val="0"/>
+        <c:ser>
+          <c:idx val="1"/>
+          <c:order val="1"/>
+          <c:tx>
+            <c:v>EBITDA Margin Adj. (%)</c:v>
+          </c:tx>
+          <c:spPr>
+            <a:ln w="28575" cap="rnd">
+              <a:solidFill>
+                <a:schemeClr val="accent2"/>
+              </a:solidFill>
+              <a:round/>
+            </a:ln>
+            <a:effectLst/>
+          </c:spPr>
+          <c:marker>
+            <c:symbol val="none"/>
+          </c:marker>
+          <c:dLbls>
+            <c:dLbl>
+              <c:idx val="0"/>
+              <c:tx>
+                <c:rich>
+                  <a:bodyPr/>
+                  <a:lstStyle/>
+                  <a:p>
+                    <a:r>
+                      <a:rPr lang="en-US"/>
+                      <a:t>8%</a:t>
+                    </a:r>
+                  </a:p>
+                </c:rich>
+              </c:tx>
+              <c:showLegendKey val="0"/>
+              <c:showVal val="1"/>
+              <c:showCatName val="0"/>
+              <c:showSerName val="0"/>
+              <c:showPercent val="0"/>
+              <c:showBubbleSize val="0"/>
+              <c:separator>. </c:separator>
+              <c:extLst>
+                <c:ext xmlns:c15="http://schemas.microsoft.com/office/drawing/2012/chart" uri="{CE6537A1-D6FC-4f65-9D91-7224C49458BB}">
+                  <c15:showDataLabelsRange val="0"/>
+                </c:ext>
+                <c:ext xmlns:c16="http://schemas.microsoft.com/office/drawing/2014/chart" uri="{C3380CC4-5D6E-409C-BE32-E72D297353CC}">
+                  <c16:uniqueId val="{0000000A-11B0-445A-96A1-F827D5FC7714}"/>
+                </c:ext>
+              </c:extLst>
+            </c:dLbl>
+            <c:dLbl>
+              <c:idx val="1"/>
+              <c:tx>
+                <c:rich>
+                  <a:bodyPr/>
+                  <a:lstStyle/>
+                  <a:p>
+                    <a:r>
+                      <a:rPr lang="en-US"/>
+                      <a:t>9%</a:t>
+                    </a:r>
+                  </a:p>
+                </c:rich>
+              </c:tx>
+              <c:showLegendKey val="0"/>
+              <c:showVal val="1"/>
+              <c:showCatName val="0"/>
+              <c:showSerName val="0"/>
+              <c:showPercent val="0"/>
+              <c:showBubbleSize val="0"/>
+              <c:extLst>
+                <c:ext xmlns:c15="http://schemas.microsoft.com/office/drawing/2012/chart" uri="{CE6537A1-D6FC-4f65-9D91-7224C49458BB}">
+                  <c15:showDataLabelsRange val="0"/>
+                </c:ext>
+                <c:ext xmlns:c16="http://schemas.microsoft.com/office/drawing/2014/chart" uri="{C3380CC4-5D6E-409C-BE32-E72D297353CC}">
+                  <c16:uniqueId val="{0000000B-11B0-445A-96A1-F827D5FC7714}"/>
+                </c:ext>
+              </c:extLst>
+            </c:dLbl>
+            <c:dLbl>
+              <c:idx val="2"/>
+              <c:tx>
+                <c:rich>
+                  <a:bodyPr/>
+                  <a:lstStyle/>
+                  <a:p>
+                    <a:r>
+                      <a:rPr lang="en-US"/>
+                      <a:t>13%</a:t>
+                    </a:r>
+                  </a:p>
+                </c:rich>
+              </c:tx>
+              <c:showLegendKey val="0"/>
+              <c:showVal val="1"/>
+              <c:showCatName val="0"/>
+              <c:showSerName val="0"/>
+              <c:showPercent val="0"/>
+              <c:showBubbleSize val="0"/>
+              <c:extLst>
+                <c:ext xmlns:c15="http://schemas.microsoft.com/office/drawing/2012/chart" uri="{CE6537A1-D6FC-4f65-9D91-7224C49458BB}">
+                  <c15:showDataLabelsRange val="0"/>
+                </c:ext>
+                <c:ext xmlns:c16="http://schemas.microsoft.com/office/drawing/2014/chart" uri="{C3380CC4-5D6E-409C-BE32-E72D297353CC}">
+                  <c16:uniqueId val="{0000000C-11B0-445A-96A1-F827D5FC7714}"/>
+                </c:ext>
+              </c:extLst>
+            </c:dLbl>
+            <c:dLbl>
+              <c:idx val="3"/>
+              <c:tx>
+                <c:rich>
+                  <a:bodyPr/>
+                  <a:lstStyle/>
+                  <a:p>
+                    <a:r>
+                      <a:rPr lang="en-US"/>
+                      <a:t>12%</a:t>
+                    </a:r>
+                  </a:p>
+                </c:rich>
+              </c:tx>
+              <c:showLegendKey val="0"/>
+              <c:showVal val="1"/>
+              <c:showCatName val="0"/>
+              <c:showSerName val="0"/>
+              <c:showPercent val="0"/>
+              <c:showBubbleSize val="0"/>
+              <c:extLst>
+                <c:ext xmlns:c15="http://schemas.microsoft.com/office/drawing/2012/chart" uri="{CE6537A1-D6FC-4f65-9D91-7224C49458BB}">
+                  <c15:showDataLabelsRange val="0"/>
+                </c:ext>
+                <c:ext xmlns:c16="http://schemas.microsoft.com/office/drawing/2014/chart" uri="{C3380CC4-5D6E-409C-BE32-E72D297353CC}">
+                  <c16:uniqueId val="{0000000D-11B0-445A-96A1-F827D5FC7714}"/>
+                </c:ext>
+              </c:extLst>
+            </c:dLbl>
+            <c:dLbl>
+              <c:idx val="4"/>
+              <c:tx>
+                <c:rich>
+                  <a:bodyPr/>
+                  <a:lstStyle/>
+                  <a:p>
+                    <a:fld id="{6A5C2F2E-CD89-4623-B4CF-0CD3B506B15E}" type="VALUE">
+                      <a:rPr lang="en-US" smtClean="0"/>
+                      <a:pPr/>
+                      <a:t>[VALUE]</a:t>
+                    </a:fld>
+                    <a:r>
+                      <a:rPr lang="en-US"/>
+                      <a:t>%</a:t>
+                    </a:r>
+                  </a:p>
+                </c:rich>
+              </c:tx>
+              <c:showLegendKey val="0"/>
+              <c:showVal val="1"/>
+              <c:showCatName val="0"/>
+              <c:showSerName val="0"/>
+              <c:showPercent val="0"/>
+              <c:showBubbleSize val="0"/>
+              <c:extLst>
+                <c:ext xmlns:c15="http://schemas.microsoft.com/office/drawing/2012/chart" uri="{CE6537A1-D6FC-4f65-9D91-7224C49458BB}">
+                  <c15:dlblFieldTable/>
+                  <c15:showDataLabelsRange val="0"/>
+                </c:ext>
+                <c:ext xmlns:c16="http://schemas.microsoft.com/office/drawing/2014/chart" uri="{C3380CC4-5D6E-409C-BE32-E72D297353CC}">
+                  <c16:uniqueId val="{0000000E-11B0-445A-96A1-F827D5FC7714}"/>
+                </c:ext>
+              </c:extLst>
+            </c:dLbl>
+            <c:dLbl>
+              <c:idx val="5"/>
+              <c:tx>
+                <c:rich>
+                  <a:bodyPr/>
+                  <a:lstStyle/>
+                  <a:p>
+                    <a:r>
+                      <a:rPr lang="en-US" dirty="0"/>
+                      <a:t>18%</a:t>
+                    </a:r>
+                  </a:p>
+                </c:rich>
+              </c:tx>
+              <c:showLegendKey val="0"/>
+              <c:showVal val="1"/>
+              <c:showCatName val="0"/>
+              <c:showSerName val="0"/>
+              <c:showPercent val="0"/>
+              <c:showBubbleSize val="0"/>
+              <c:extLst>
+                <c:ext xmlns:c15="http://schemas.microsoft.com/office/drawing/2012/chart" uri="{CE6537A1-D6FC-4f65-9D91-7224C49458BB}">
+                  <c15:showDataLabelsRange val="0"/>
+                </c:ext>
+                <c:ext xmlns:c16="http://schemas.microsoft.com/office/drawing/2014/chart" uri="{C3380CC4-5D6E-409C-BE32-E72D297353CC}">
+                  <c16:uniqueId val="{0000000F-11B0-445A-96A1-F827D5FC7714}"/>
+                </c:ext>
+              </c:extLst>
+            </c:dLbl>
+            <c:dLbl>
+              <c:idx val="6"/>
+              <c:tx>
+                <c:rich>
+                  <a:bodyPr/>
+                  <a:lstStyle/>
+                  <a:p>
+                    <a:r>
+                      <a:rPr lang="en-US"/>
+                      <a:t>9%</a:t>
+                    </a:r>
+                  </a:p>
+                </c:rich>
+              </c:tx>
+              <c:showLegendKey val="0"/>
+              <c:showVal val="1"/>
+              <c:showCatName val="0"/>
+              <c:showSerName val="0"/>
+              <c:showPercent val="0"/>
+              <c:showBubbleSize val="0"/>
+              <c:extLst>
+                <c:ext xmlns:c15="http://schemas.microsoft.com/office/drawing/2012/chart" uri="{CE6537A1-D6FC-4f65-9D91-7224C49458BB}">
+                  <c15:showDataLabelsRange val="0"/>
+                </c:ext>
+                <c:ext xmlns:c16="http://schemas.microsoft.com/office/drawing/2014/chart" uri="{C3380CC4-5D6E-409C-BE32-E72D297353CC}">
+                  <c16:uniqueId val="{00000010-11B0-445A-96A1-F827D5FC7714}"/>
+                </c:ext>
+              </c:extLst>
+            </c:dLbl>
+            <c:dLbl>
+              <c:idx val="8"/>
+              <c:tx>
+                <c:rich>
+                  <a:bodyPr/>
+                  <a:lstStyle/>
+                  <a:p>
+                    <a:r>
+                      <a:rPr lang="en-US"/>
+                      <a:t>12%</a:t>
+                    </a:r>
+                  </a:p>
+                </c:rich>
+              </c:tx>
+              <c:showLegendKey val="0"/>
+              <c:showVal val="1"/>
+              <c:showCatName val="0"/>
+              <c:showSerName val="0"/>
+              <c:showPercent val="0"/>
+              <c:showBubbleSize val="0"/>
+              <c:extLst>
+                <c:ext xmlns:c15="http://schemas.microsoft.com/office/drawing/2012/chart" uri="{CE6537A1-D6FC-4f65-9D91-7224C49458BB}">
+                  <c15:showDataLabelsRange val="0"/>
+                </c:ext>
+                <c:ext xmlns:c16="http://schemas.microsoft.com/office/drawing/2014/chart" uri="{C3380CC4-5D6E-409C-BE32-E72D297353CC}">
+                  <c16:uniqueId val="{00000011-11B0-445A-96A1-F827D5FC7714}"/>
+                </c:ext>
+              </c:extLst>
+            </c:dLbl>
+            <c:spPr>
+              <a:noFill/>
+              <a:ln>
+                <a:noFill/>
+              </a:ln>
+              <a:effectLst/>
+            </c:spPr>
+            <c:txPr>
+              <a:bodyPr rot="0" spcFirstLastPara="1" vertOverflow="ellipsis" vert="horz" wrap="square" lIns="38100" tIns="19050" rIns="38100" bIns="19050" anchor="ctr" anchorCtr="1">
+                <a:spAutoFit/>
+              </a:bodyPr>
+              <a:lstStyle/>
+              <a:p>
+                <a:pPr>
+                  <a:defRPr sz="700" b="1" i="0" u="none" strike="noStrike" kern="1200" baseline="0">
+                    <a:solidFill>
+                      <a:schemeClr val="tx1">
+                        <a:lumMod val="75000"/>
+                        <a:lumOff val="25000"/>
+                      </a:schemeClr>
+                    </a:solidFill>
+                    <a:latin typeface="+mn-lt"/>
+                    <a:ea typeface="+mn-ea"/>
+                    <a:cs typeface="+mn-cs"/>
+                  </a:defRPr>
+                </a:pPr>
+                <a:endParaRPr lang="it-IT"/>
+              </a:p>
+            </c:txPr>
+            <c:showLegendKey val="0"/>
+            <c:showVal val="1"/>
+            <c:showCatName val="0"/>
+            <c:showSerName val="0"/>
+            <c:showPercent val="0"/>
+            <c:showBubbleSize val="0"/>
+            <c:showLeaderLines val="0"/>
+            <c:extLst>
+              <c:ext xmlns:c15="http://schemas.microsoft.com/office/drawing/2012/chart" uri="{CE6537A1-D6FC-4f65-9D91-7224C49458BB}">
+                <c15:showLeaderLines val="1"/>
+                <c15:leaderLines>
+                  <c:spPr>
+                    <a:ln w="9525">
+                      <a:solidFill>
+                        <a:schemeClr val="tx1">
+                          <a:lumMod val="35000"/>
+                          <a:lumOff val="65000"/>
+                        </a:schemeClr>
+                      </a:solidFill>
+                    </a:ln>
+                    <a:effectLst/>
+                  </c:spPr>
+                </c15:leaderLines>
+              </c:ext>
+            </c:extLst>
+          </c:dLbls>
+          <c:val>
+            <c:numRef>
+              <c:f>Sheet1!$A$2:$I$2</c:f>
+              <c:numCache>
+                <c:formatCode>General</c:formatCode>
+                <c:ptCount val="9"/>
+                <c:pt idx="0">
+                  <c:v>8.3000000000000007</c:v>
+                </c:pt>
+                <c:pt idx="1">
+                  <c:v>9.0138530863133255</c:v>
+                </c:pt>
+                <c:pt idx="2">
+                  <c:v>13.349205725141871</c:v>
+                </c:pt>
+                <c:pt idx="3">
+                  <c:v>12.244554809782283</c:v>
+                </c:pt>
+                <c:pt idx="4">
+                  <c:v>13</c:v>
+                </c:pt>
+                <c:pt idx="5">
+                  <c:v>11.899999999999999</c:v>
+                </c:pt>
+                <c:pt idx="6">
+                  <c:v>9.1999999999999993</c:v>
+                </c:pt>
+                <c:pt idx="7">
+                  <c:v>10</c:v>
+                </c:pt>
+                <c:pt idx="8">
+                  <c:v>11.5</c:v>
+                </c:pt>
+              </c:numCache>
+            </c:numRef>
+          </c:val>
+          <c:smooth val="0"/>
+          <c:extLst>
+            <c:ext xmlns:c16="http://schemas.microsoft.com/office/drawing/2014/chart" uri="{C3380CC4-5D6E-409C-BE32-E72D297353CC}">
+              <c16:uniqueId val="{00000012-11B0-445A-96A1-F827D5FC7714}"/>
+            </c:ext>
+          </c:extLst>
+        </c:ser>
+        <c:dLbls>
+          <c:showLegendKey val="0"/>
+          <c:showVal val="0"/>
+          <c:showCatName val="0"/>
+          <c:showSerName val="0"/>
+          <c:showPercent val="0"/>
+          <c:showBubbleSize val="0"/>
+        </c:dLbls>
+        <c:marker val="1"/>
+        <c:smooth val="0"/>
+        <c:axId val="2"/>
+        <c:axId val="3"/>
+      </c:lineChart>
+      <c:catAx>
+        <c:axId val="57061936"/>
+        <c:scaling>
+          <c:orientation val="minMax"/>
+        </c:scaling>
+        <c:delete val="0"/>
+        <c:axPos val="b"/>
+        <c:majorTickMark val="none"/>
+        <c:minorTickMark val="none"/>
+        <c:tickLblPos val="none"/>
+        <c:spPr>
+          <a:noFill/>
+          <a:ln w="19050" cap="flat" cmpd="sng" algn="ctr">
+            <a:solidFill>
+              <a:schemeClr val="tx1">
+                <a:lumMod val="25000"/>
+                <a:lumOff val="75000"/>
+              </a:schemeClr>
+            </a:solidFill>
+            <a:round/>
+          </a:ln>
+          <a:effectLst/>
+        </c:spPr>
+        <c:txPr>
+          <a:bodyPr rot="-60000000" spcFirstLastPara="1" vertOverflow="ellipsis" vert="horz" wrap="square" anchor="ctr" anchorCtr="1"/>
+          <a:lstStyle/>
+          <a:p>
+            <a:pPr>
+              <a:defRPr sz="1197" b="0" i="0" u="none" strike="noStrike" kern="1200" baseline="0">
+                <a:solidFill>
+                  <a:schemeClr val="tx1">
+                    <a:lumMod val="65000"/>
+                    <a:lumOff val="35000"/>
+                  </a:schemeClr>
+                </a:solidFill>
+                <a:latin typeface="+mn-lt"/>
+                <a:ea typeface="+mn-ea"/>
+                <a:cs typeface="+mn-cs"/>
+              </a:defRPr>
+            </a:pPr>
+            <a:endParaRPr lang="it-IT"/>
+          </a:p>
+        </c:txPr>
+        <c:crossAx val="1"/>
+        <c:crosses val="min"/>
+        <c:auto val="0"/>
+        <c:lblAlgn val="ctr"/>
+        <c:lblOffset val="100"/>
+        <c:noMultiLvlLbl val="0"/>
+      </c:catAx>
+      <c:valAx>
+        <c:axId val="1"/>
+        <c:scaling>
+          <c:orientation val="minMax"/>
+          <c:max val="114.6"/>
+          <c:min val="0"/>
+        </c:scaling>
+        <c:delete val="0"/>
+        <c:axPos val="l"/>
+        <c:majorGridlines>
+          <c:spPr>
+            <a:ln>
+              <a:solidFill>
+                <a:schemeClr val="tx1">
+                  <a:lumMod val="15000"/>
+                  <a:lumOff val="85000"/>
+                </a:schemeClr>
+              </a:solidFill>
+            </a:ln>
+            <a:effectLst/>
+          </c:spPr>
+        </c:majorGridlines>
+        <c:numFmt formatCode="#,##0;&quot;-&quot;#,##0" sourceLinked="1"/>
+        <c:majorTickMark val="none"/>
+        <c:minorTickMark val="none"/>
+        <c:tickLblPos val="none"/>
+        <c:spPr>
+          <a:noFill/>
+          <a:ln>
+            <a:noFill/>
+          </a:ln>
+          <a:effectLst/>
+        </c:spPr>
+        <c:txPr>
+          <a:bodyPr rot="-60000000" spcFirstLastPara="1" vertOverflow="ellipsis" vert="horz" wrap="square" anchor="ctr" anchorCtr="1"/>
+          <a:lstStyle/>
+          <a:p>
+            <a:pPr>
+              <a:defRPr sz="1197" b="0" i="0" u="none" strike="noStrike" kern="1200" baseline="0">
+                <a:solidFill>
+                  <a:schemeClr val="tx1">
+                    <a:lumMod val="65000"/>
+                    <a:lumOff val="35000"/>
+                  </a:schemeClr>
+                </a:solidFill>
+                <a:latin typeface="+mn-lt"/>
+                <a:ea typeface="+mn-ea"/>
+                <a:cs typeface="+mn-cs"/>
+              </a:defRPr>
+            </a:pPr>
+            <a:endParaRPr lang="it-IT"/>
+          </a:p>
+        </c:txPr>
+        <c:crossAx val="57061936"/>
+        <c:crosses val="min"/>
+        <c:crossBetween val="between"/>
+      </c:valAx>
+      <c:catAx>
+        <c:axId val="2"/>
+        <c:scaling>
+          <c:orientation val="minMax"/>
+        </c:scaling>
+        <c:delete val="1"/>
+        <c:axPos val="b"/>
+        <c:majorTickMark val="none"/>
+        <c:minorTickMark val="none"/>
+        <c:tickLblPos val="none"/>
+        <c:crossAx val="3"/>
+        <c:crosses val="min"/>
+        <c:auto val="0"/>
+        <c:lblAlgn val="ctr"/>
+        <c:lblOffset val="100"/>
+        <c:noMultiLvlLbl val="0"/>
+      </c:catAx>
+      <c:valAx>
+        <c:axId val="3"/>
+        <c:scaling>
+          <c:orientation val="minMax"/>
+          <c:max val="14.5"/>
+          <c:min val="0"/>
+        </c:scaling>
+        <c:delete val="0"/>
+        <c:axPos val="r"/>
+        <c:majorGridlines>
+          <c:spPr>
+            <a:ln>
+              <a:solidFill>
+                <a:schemeClr val="tx1">
+                  <a:lumMod val="15000"/>
+                  <a:lumOff val="85000"/>
+                </a:schemeClr>
+              </a:solidFill>
+            </a:ln>
+            <a:effectLst/>
+          </c:spPr>
+        </c:majorGridlines>
+        <c:numFmt formatCode="General" sourceLinked="1"/>
+        <c:majorTickMark val="none"/>
+        <c:minorTickMark val="none"/>
+        <c:tickLblPos val="none"/>
+        <c:spPr>
+          <a:noFill/>
+          <a:ln>
+            <a:noFill/>
+          </a:ln>
+          <a:effectLst/>
+        </c:spPr>
+        <c:txPr>
+          <a:bodyPr rot="-60000000" spcFirstLastPara="1" vertOverflow="ellipsis" vert="horz" wrap="square" anchor="ctr" anchorCtr="1"/>
+          <a:lstStyle/>
+          <a:p>
+            <a:pPr>
+              <a:defRPr sz="1197" b="0" i="0" u="none" strike="noStrike" kern="1200" baseline="0">
+                <a:solidFill>
+                  <a:schemeClr val="tx1">
+                    <a:lumMod val="65000"/>
+                    <a:lumOff val="35000"/>
+                  </a:schemeClr>
+                </a:solidFill>
+                <a:latin typeface="+mn-lt"/>
+                <a:ea typeface="+mn-ea"/>
+                <a:cs typeface="+mn-cs"/>
+              </a:defRPr>
+            </a:pPr>
+            <a:endParaRPr lang="it-IT"/>
+          </a:p>
+        </c:txPr>
+        <c:crossAx val="2"/>
+        <c:crosses val="max"/>
+        <c:crossBetween val="between"/>
+      </c:valAx>
+      <c:spPr>
+        <a:noFill/>
+        <a:ln>
+          <a:noFill/>
+        </a:ln>
+        <a:effectLst/>
+      </c:spPr>
+    </c:plotArea>
+    <c:legend>
+      <c:legendPos val="t"/>
+      <c:legendEntry>
+        <c:idx val="1"/>
+        <c:txPr>
+          <a:bodyPr rot="0" spcFirstLastPara="1" vertOverflow="ellipsis" vert="horz" wrap="square" anchor="ctr" anchorCtr="1"/>
+          <a:lstStyle/>
+          <a:p>
+            <a:pPr>
+              <a:defRPr sz="900" b="0" i="0" u="none" strike="noStrike" kern="1200" baseline="0">
+                <a:solidFill>
+                  <a:schemeClr val="tx1">
+                    <a:lumMod val="65000"/>
+                    <a:lumOff val="35000"/>
+                  </a:schemeClr>
+                </a:solidFill>
+                <a:latin typeface="+mn-lt"/>
+                <a:ea typeface="+mn-ea"/>
+                <a:cs typeface="+mn-cs"/>
+              </a:defRPr>
+            </a:pPr>
+            <a:endParaRPr lang="it-IT"/>
+          </a:p>
+        </c:txPr>
+      </c:legendEntry>
+      <c:overlay val="0"/>
+      <c:spPr>
+        <a:noFill/>
+        <a:ln>
+          <a:noFill/>
+        </a:ln>
+        <a:effectLst/>
+      </c:spPr>
+      <c:txPr>
+        <a:bodyPr rot="0" spcFirstLastPara="1" vertOverflow="ellipsis" vert="horz" wrap="square" anchor="ctr" anchorCtr="1"/>
+        <a:lstStyle/>
+        <a:p>
+          <a:pPr>
+            <a:defRPr sz="900" b="0" i="0" u="none" strike="noStrike" kern="1200" baseline="0">
+              <a:solidFill>
+                <a:schemeClr val="tx1">
+                  <a:lumMod val="65000"/>
+                  <a:lumOff val="35000"/>
+                </a:schemeClr>
+              </a:solidFill>
+              <a:latin typeface="+mn-lt"/>
+              <a:ea typeface="+mn-ea"/>
+              <a:cs typeface="+mn-cs"/>
+            </a:defRPr>
+          </a:pPr>
+          <a:endParaRPr lang="it-IT"/>
+        </a:p>
+      </c:txPr>
+    </c:legend>
+    <c:plotVisOnly val="0"/>
+    <c:dispBlanksAs val="gap"/>
+    <c:showDLblsOverMax val="1"/>
+  </c:chart>
+  <c:spPr>
+    <a:noFill/>
+    <a:ln>
+      <a:noFill/>
+    </a:ln>
+    <a:effectLst/>
+  </c:spPr>
+  <c:txPr>
+    <a:bodyPr/>
+    <a:lstStyle/>
+    <a:p>
+      <a:pPr>
+        <a:defRPr/>
+      </a:pPr>
+      <a:endParaRPr lang="it-IT"/>
+    </a:p>
+  </c:txPr>
+  <c:externalData r:id="rId3">
+    <c:autoUpdate val="0"/>
+  </c:externalData>
+</c:chartSpace>
+</file>
+
+<file path=ppt/charts/colors1.xml><?xml version="1.0" encoding="utf-8"?>
+<cs:colorStyle xmlns:cs="http://schemas.microsoft.com/office/drawing/2012/chartStyle" xmlns:a="http://schemas.openxmlformats.org/drawingml/2006/main" meth="cycle" id="10">
+  <a:schemeClr val="accent1"/>
+  <a:schemeClr val="accent2"/>
+  <a:schemeClr val="accent3"/>
+  <a:schemeClr val="accent4"/>
+  <a:schemeClr val="accent5"/>
+  <a:schemeClr val="accent6"/>
+  <cs:variation/>
+  <cs:variation>
+    <a:lumMod val="60000"/>
+  </cs:variation>
+  <cs:variation>
+    <a:lumMod val="80000"/>
+    <a:lumOff val="20000"/>
+  </cs:variation>
+  <cs:variation>
+    <a:lumMod val="80000"/>
+  </cs:variation>
+  <cs:variation>
+    <a:lumMod val="60000"/>
+    <a:lumOff val="40000"/>
+  </cs:variation>
+  <cs:variation>
+    <a:lumMod val="50000"/>
+  </cs:variation>
+  <cs:variation>
+    <a:lumMod val="70000"/>
+    <a:lumOff val="30000"/>
+  </cs:variation>
+  <cs:variation>
+    <a:lumMod val="70000"/>
+  </cs:variation>
+  <cs:variation>
+    <a:lumMod val="50000"/>
+    <a:lumOff val="50000"/>
+  </cs:variation>
+</cs:colorStyle>
+</file>
+
+<file path=ppt/charts/style1.xml><?xml version="1.0" encoding="utf-8"?>
+<cs:chartStyle xmlns:cs="http://schemas.microsoft.com/office/drawing/2012/chartStyle" xmlns:a="http://schemas.openxmlformats.org/drawingml/2006/main" id="323">
+  <cs:axisTitle>
+    <cs:lnRef idx="0"/>
+    <cs:fillRef idx="0"/>
+    <cs:effectRef idx="0"/>
+    <cs:fontRef idx="minor">
+      <a:schemeClr val="tx1">
+        <a:lumMod val="65000"/>
+        <a:lumOff val="35000"/>
+      </a:schemeClr>
+    </cs:fontRef>
+    <cs:defRPr sz="1197" b="1" kern="1200"/>
+  </cs:axisTitle>
+  <cs:categoryAxis>
+    <cs:lnRef idx="0"/>
+    <cs:fillRef idx="0"/>
+    <cs:effectRef idx="0"/>
+    <cs:fontRef idx="minor">
+      <a:schemeClr val="tx1">
+        <a:lumMod val="65000"/>
+        <a:lumOff val="35000"/>
+      </a:schemeClr>
+    </cs:fontRef>
+    <cs:spPr>
+      <a:ln w="19050" cap="flat" cmpd="sng" algn="ctr">
+        <a:solidFill>
+          <a:schemeClr val="tx1">
+            <a:lumMod val="25000"/>
+            <a:lumOff val="75000"/>
+          </a:schemeClr>
+        </a:solidFill>
+        <a:round/>
+      </a:ln>
+    </cs:spPr>
+    <cs:defRPr sz="1197" kern="1200"/>
+  </cs:categoryAxis>
+  <cs:chartArea mods="allowNoFillOverride allowNoLineOverride">
+    <cs:lnRef idx="0"/>
+    <cs:fillRef idx="0"/>
+    <cs:effectRef idx="0"/>
+    <cs:fontRef idx="minor">
+      <a:schemeClr val="dk1"/>
+    </cs:fontRef>
+    <cs:spPr>
+      <a:solidFill>
+        <a:schemeClr val="bg1"/>
+      </a:solidFill>
+      <a:ln w="9525" cap="flat" cmpd="sng" algn="ctr">
+        <a:solidFill>
+          <a:schemeClr val="tx1">
+            <a:lumMod val="15000"/>
+            <a:lumOff val="85000"/>
+          </a:schemeClr>
+        </a:solidFill>
+        <a:round/>
+      </a:ln>
+    </cs:spPr>
+    <cs:defRPr sz="1197" kern="1200"/>
+  </cs:chartArea>
+  <cs:dataLabel>
+    <cs:lnRef idx="0"/>
+    <cs:fillRef idx="0"/>
+    <cs:effectRef idx="0"/>
+    <cs:fontRef idx="minor">
+      <a:schemeClr val="tx1">
+        <a:lumMod val="75000"/>
+        <a:lumOff val="25000"/>
+      </a:schemeClr>
+    </cs:fontRef>
+    <cs:defRPr sz="1197" kern="1200"/>
+  </cs:dataLabel>
+  <cs:dataLabelCallout>
+    <cs:lnRef idx="0"/>
+    <cs:fillRef idx="0"/>
+    <cs:effectRef idx="0"/>
+    <cs:fontRef idx="minor">
+      <a:schemeClr val="dk1">
+        <a:lumMod val="65000"/>
+        <a:lumOff val="35000"/>
+      </a:schemeClr>
+    </cs:fontRef>
+    <cs:spPr>
+      <a:solidFill>
+        <a:schemeClr val="lt1"/>
+      </a:solidFill>
+      <a:ln>
+        <a:solidFill>
+          <a:schemeClr val="dk1">
+            <a:lumMod val="25000"/>
+            <a:lumOff val="75000"/>
+          </a:schemeClr>
+        </a:solidFill>
+      </a:ln>
+    </cs:spPr>
+    <cs:defRPr sz="1197" kern="1200"/>
+    <cs:bodyPr rot="0" spcFirstLastPara="1" vertOverflow="clip" horzOverflow="clip" vert="horz" wrap="square" lIns="36576" tIns="18288" rIns="36576" bIns="18288" anchor="ctr" anchorCtr="1">
+      <a:spAutoFit/>
+    </cs:bodyPr>
+  </cs:dataLabelCallout>
+  <cs:dataPoint>
+    <cs:lnRef idx="0"/>
+    <cs:fillRef idx="0">
+      <cs:styleClr val="auto"/>
+    </cs:fillRef>
+    <cs:effectRef idx="0">
+      <cs:styleClr val="auto"/>
+    </cs:effectRef>
+    <cs:fontRef idx="minor">
+      <a:schemeClr val="dk1"/>
+    </cs:fontRef>
+    <cs:spPr>
+      <a:pattFill prst="narHorz">
+        <a:fgClr>
+          <a:schemeClr val="phClr"/>
+        </a:fgClr>
+        <a:bgClr>
+          <a:schemeClr val="phClr">
+            <a:lumMod val="20000"/>
+            <a:lumOff val="80000"/>
+          </a:schemeClr>
+        </a:bgClr>
+      </a:pattFill>
+      <a:effectLst>
+        <a:innerShdw blurRad="114300">
+          <a:schemeClr val="phClr"/>
+        </a:innerShdw>
+      </a:effectLst>
+    </cs:spPr>
+  </cs:dataPoint>
+  <cs:dataPoint3D>
+    <cs:lnRef idx="0"/>
+    <cs:fillRef idx="0">
+      <cs:styleClr val="auto"/>
+    </cs:fillRef>
+    <cs:effectRef idx="0"/>
+    <cs:fontRef idx="minor">
+      <a:schemeClr val="dk1"/>
+    </cs:fontRef>
+    <cs:spPr>
+      <a:pattFill prst="narHorz">
+        <a:fgClr>
+          <a:schemeClr val="phClr"/>
+        </a:fgClr>
+        <a:bgClr>
+          <a:schemeClr val="phClr">
+            <a:lumMod val="20000"/>
+            <a:lumOff val="80000"/>
+          </a:schemeClr>
+        </a:bgClr>
+      </a:pattFill>
+      <a:effectLst>
+        <a:innerShdw blurRad="114300">
+          <a:schemeClr val="phClr"/>
+        </a:innerShdw>
+      </a:effectLst>
+    </cs:spPr>
+  </cs:dataPoint3D>
+  <cs:dataPointLine>
+    <cs:lnRef idx="0">
+      <cs:styleClr val="auto"/>
+    </cs:lnRef>
+    <cs:fillRef idx="0"/>
+    <cs:effectRef idx="0"/>
+    <cs:fontRef idx="minor">
+      <a:schemeClr val="dk1"/>
+    </cs:fontRef>
+    <cs:spPr>
+      <a:ln w="28575" cap="rnd">
+        <a:solidFill>
+          <a:schemeClr val="phClr"/>
+        </a:solidFill>
+        <a:round/>
+      </a:ln>
+    </cs:spPr>
+  </cs:dataPointLine>
+  <cs:dataPointMarker>
+    <cs:lnRef idx="0"/>
+    <cs:fillRef idx="0">
+      <cs:styleClr val="auto"/>
+    </cs:fillRef>
+    <cs:effectRef idx="0"/>
+    <cs:fontRef idx="minor">
+      <a:schemeClr val="dk1"/>
+    </cs:fontRef>
+    <cs:spPr>
+      <a:solidFill>
+        <a:schemeClr val="phClr"/>
+      </a:solidFill>
+    </cs:spPr>
+  </cs:dataPointMarker>
+  <cs:dataPointMarkerLayout symbol="circle" size="6"/>
+  <cs:dataPointWireframe>
+    <cs:lnRef idx="0">
+      <cs:styleClr val="auto"/>
+    </cs:lnRef>
+    <cs:fillRef idx="0"/>
+    <cs:effectRef idx="0"/>
+    <cs:fontRef idx="minor">
+      <a:schemeClr val="dk1"/>
+    </cs:fontRef>
+    <cs:spPr>
+      <a:ln w="9525" cap="rnd">
+        <a:solidFill>
+          <a:schemeClr val="phClr"/>
+        </a:solidFill>
+        <a:round/>
+      </a:ln>
+    </cs:spPr>
+  </cs:dataPointWireframe>
+  <cs:dataTable>
+    <cs:lnRef idx="0"/>
+    <cs:fillRef idx="0"/>
+    <cs:effectRef idx="0"/>
+    <cs:fontRef idx="minor">
+      <a:schemeClr val="tx1">
+        <a:lumMod val="65000"/>
+        <a:lumOff val="35000"/>
+      </a:schemeClr>
+    </cs:fontRef>
+    <cs:spPr>
+      <a:ln w="9525">
+        <a:solidFill>
+          <a:schemeClr val="tx1">
+            <a:lumMod val="15000"/>
+            <a:lumOff val="85000"/>
+          </a:schemeClr>
+        </a:solidFill>
+      </a:ln>
+    </cs:spPr>
+    <cs:defRPr sz="1197" kern="1200"/>
+  </cs:dataTable>
+  <cs:downBar>
+    <cs:lnRef idx="0"/>
+    <cs:fillRef idx="0"/>
+    <cs:effectRef idx="0"/>
+    <cs:fontRef idx="minor">
+      <a:schemeClr val="dk1"/>
+    </cs:fontRef>
+    <cs:spPr>
+      <a:solidFill>
+        <a:schemeClr val="dk1">
+          <a:lumMod val="65000"/>
+          <a:lumOff val="35000"/>
+        </a:schemeClr>
+      </a:solidFill>
+      <a:ln w="9525" cap="flat" cmpd="sng" algn="ctr">
+        <a:solidFill>
+          <a:schemeClr val="tx1">
+            <a:lumMod val="65000"/>
+            <a:lumOff val="35000"/>
+          </a:schemeClr>
+        </a:solidFill>
+        <a:round/>
+      </a:ln>
+    </cs:spPr>
+  </cs:downBar>
+  <cs:dropLine>
+    <cs:lnRef idx="0"/>
+    <cs:fillRef idx="0"/>
+    <cs:effectRef idx="0"/>
+    <cs:fontRef idx="minor">
+      <a:schemeClr val="dk1"/>
+    </cs:fontRef>
+    <cs:spPr>
+      <a:ln w="9525">
+        <a:solidFill>
+          <a:schemeClr val="tx1">
+            <a:lumMod val="35000"/>
+            <a:lumOff val="65000"/>
+          </a:schemeClr>
+        </a:solidFill>
+        <a:round/>
+      </a:ln>
+    </cs:spPr>
+  </cs:dropLine>
+  <cs:errorBar>
+    <cs:lnRef idx="0"/>
+    <cs:fillRef idx="0"/>
+    <cs:effectRef idx="0"/>
+    <cs:fontRef idx="minor">
+      <a:schemeClr val="dk1"/>
+    </cs:fontRef>
+    <cs:spPr>
+      <a:ln w="9525">
+        <a:solidFill>
+          <a:schemeClr val="tx1">
+            <a:lumMod val="50000"/>
+            <a:lumOff val="50000"/>
+          </a:schemeClr>
+        </a:solidFill>
+        <a:round/>
+      </a:ln>
+    </cs:spPr>
+  </cs:errorBar>
+  <cs:floor>
+    <cs:lnRef idx="0"/>
+    <cs:fillRef idx="0"/>
+    <cs:effectRef idx="0"/>
+    <cs:fontRef idx="minor">
+      <a:schemeClr val="dk1"/>
+    </cs:fontRef>
+  </cs:floor>
+  <cs:gridlineMajor>
+    <cs:lnRef idx="0"/>
+    <cs:fillRef idx="0"/>
+    <cs:effectRef idx="0"/>
+    <cs:fontRef idx="minor">
+      <a:schemeClr val="dk1"/>
+    </cs:fontRef>
+    <cs:spPr>
+      <a:ln>
+        <a:solidFill>
+          <a:schemeClr val="tx1">
+            <a:lumMod val="15000"/>
+            <a:lumOff val="85000"/>
+          </a:schemeClr>
+        </a:solidFill>
+      </a:ln>
+    </cs:spPr>
+  </cs:gridlineMajor>
+  <cs:gridlineMinor>
+    <cs:lnRef idx="0"/>
+    <cs:fillRef idx="0"/>
+    <cs:effectRef idx="0"/>
+    <cs:fontRef idx="minor">
+      <a:schemeClr val="dk1"/>
+    </cs:fontRef>
+    <cs:spPr>
+      <a:ln>
+        <a:solidFill>
+          <a:schemeClr val="tx1">
+            <a:lumMod val="5000"/>
+            <a:lumOff val="95000"/>
+          </a:schemeClr>
+        </a:solidFill>
+      </a:ln>
+    </cs:spPr>
+  </cs:gridlineMinor>
+  <cs:hiLoLine>
+    <cs:lnRef idx="0"/>
+    <cs:fillRef idx="0"/>
+    <cs:effectRef idx="0"/>
+    <cs:fontRef idx="minor">
+      <a:schemeClr val="dk1"/>
+    </cs:fontRef>
+    <cs:spPr>
+      <a:ln w="15875" cap="flat" cmpd="sng" algn="ctr">
+        <a:solidFill>
+          <a:schemeClr val="tx1">
+            <a:lumMod val="65000"/>
+            <a:lumOff val="35000"/>
+          </a:schemeClr>
+        </a:solidFill>
+        <a:round/>
+      </a:ln>
+    </cs:spPr>
+  </cs:hiLoLine>
+  <cs:leaderLine>
+    <cs:lnRef idx="0"/>
+    <cs:fillRef idx="0"/>
+    <cs:effectRef idx="0"/>
+    <cs:fontRef idx="minor">
+      <a:schemeClr val="dk1"/>
+    </cs:fontRef>
+    <cs:spPr>
+      <a:ln w="9525">
+        <a:solidFill>
+          <a:schemeClr val="tx1">
+            <a:lumMod val="35000"/>
+            <a:lumOff val="65000"/>
+          </a:schemeClr>
+        </a:solidFill>
+      </a:ln>
+    </cs:spPr>
+  </cs:leaderLine>
+  <cs:legend>
+    <cs:lnRef idx="0"/>
+    <cs:fillRef idx="0"/>
+    <cs:effectRef idx="0"/>
+    <cs:fontRef idx="minor">
+      <a:schemeClr val="tx1">
+        <a:lumMod val="65000"/>
+        <a:lumOff val="35000"/>
+      </a:schemeClr>
+    </cs:fontRef>
+    <cs:defRPr sz="1197" kern="1200"/>
+  </cs:legend>
+  <cs:plotArea mods="allowNoFillOverride allowNoLineOverride">
+    <cs:lnRef idx="0"/>
+    <cs:fillRef idx="0"/>
+    <cs:effectRef idx="0"/>
+    <cs:fontRef idx="minor">
+      <a:schemeClr val="dk1"/>
+    </cs:fontRef>
+  </cs:plotArea>
+  <cs:plotArea3D mods="allowNoFillOverride allowNoLineOverride">
+    <cs:lnRef idx="0"/>
+    <cs:fillRef idx="0"/>
+    <cs:effectRef idx="0"/>
+    <cs:fontRef idx="minor">
+      <a:schemeClr val="dk1"/>
+    </cs:fontRef>
+  </cs:plotArea3D>
+  <cs:seriesAxis>
+    <cs:lnRef idx="0"/>
+    <cs:fillRef idx="0"/>
+    <cs:effectRef idx="0"/>
+    <cs:fontRef idx="minor">
+      <a:schemeClr val="tx1">
+        <a:lumMod val="65000"/>
+        <a:lumOff val="35000"/>
+      </a:schemeClr>
+    </cs:fontRef>
+    <cs:defRPr sz="1197" kern="1200"/>
+  </cs:seriesAxis>
+  <cs:seriesLine>
+    <cs:lnRef idx="0"/>
+    <cs:fillRef idx="0"/>
+    <cs:effectRef idx="0"/>
+    <cs:fontRef idx="minor">
+      <a:schemeClr val="dk1"/>
+    </cs:fontRef>
+    <cs:spPr>
+      <a:ln w="9525">
+        <a:solidFill>
+          <a:schemeClr val="tx1">
+            <a:lumMod val="35000"/>
+            <a:lumOff val="65000"/>
+          </a:schemeClr>
+        </a:solidFill>
+        <a:round/>
+      </a:ln>
+    </cs:spPr>
+  </cs:seriesLine>
+  <cs:title>
+    <cs:lnRef idx="0"/>
+    <cs:fillRef idx="0"/>
+    <cs:effectRef idx="0"/>
+    <cs:fontRef idx="minor">
+      <a:schemeClr val="tx1">
+        <a:lumMod val="50000"/>
+        <a:lumOff val="50000"/>
+      </a:schemeClr>
+    </cs:fontRef>
+    <cs:defRPr sz="2200" b="1" kern="1200" cap="all" spc="150" baseline="0"/>
+  </cs:title>
+  <cs:trendline>
+    <cs:lnRef idx="0">
+      <cs:styleClr val="auto"/>
+    </cs:lnRef>
+    <cs:fillRef idx="0"/>
+    <cs:effectRef idx="0"/>
+    <cs:fontRef idx="minor">
+      <a:schemeClr val="dk1"/>
+    </cs:fontRef>
+    <cs:spPr>
+      <a:ln w="19050" cap="rnd">
+        <a:solidFill>
+          <a:schemeClr val="phClr"/>
+        </a:solidFill>
+      </a:ln>
+    </cs:spPr>
+  </cs:trendline>
+  <cs:trendlineLabel>
+    <cs:lnRef idx="0"/>
+    <cs:fillRef idx="0"/>
+    <cs:effectRef idx="0"/>
+    <cs:fontRef idx="minor">
+      <a:schemeClr val="tx1">
+        <a:lumMod val="65000"/>
+        <a:lumOff val="35000"/>
+      </a:schemeClr>
+    </cs:fontRef>
+    <cs:defRPr sz="1197" kern="1200"/>
+  </cs:trendlineLabel>
+  <cs:upBar>
+    <cs:lnRef idx="0"/>
+    <cs:fillRef idx="0"/>
+    <cs:effectRef idx="0"/>
+    <cs:fontRef idx="minor">
+      <a:schemeClr val="dk1"/>
+    </cs:fontRef>
+    <cs:spPr>
+      <a:solidFill>
+        <a:schemeClr val="lt1"/>
+      </a:solidFill>
+      <a:ln w="9525">
+        <a:solidFill>
+          <a:schemeClr val="tx1">
+            <a:lumMod val="50000"/>
+            <a:lumOff val="50000"/>
+          </a:schemeClr>
+        </a:solidFill>
+      </a:ln>
+    </cs:spPr>
+  </cs:upBar>
+  <cs:valueAxis>
+    <cs:lnRef idx="0"/>
+    <cs:fillRef idx="0"/>
+    <cs:effectRef idx="0"/>
+    <cs:fontRef idx="minor">
+      <a:schemeClr val="tx1">
+        <a:lumMod val="65000"/>
+        <a:lumOff val="35000"/>
+      </a:schemeClr>
+    </cs:fontRef>
+    <cs:defRPr sz="1197" kern="1200"/>
+  </cs:valueAxis>
+  <cs:wall>
+    <cs:lnRef idx="0"/>
+    <cs:fillRef idx="0"/>
+    <cs:effectRef idx="0"/>
+    <cs:fontRef idx="minor">
+      <a:schemeClr val="dk1"/>
+    </cs:fontRef>
+  </cs:wall>
+</cs:chartStyle>
 </file>
 
 <file path=ppt/slideLayouts/slideLayout1.xml><?xml version="1.0" encoding="utf-8"?>
@@ -147,10 +2394,9 @@
           <a:lstStyle/>
           <a:p>
             <a:r>
-              <a:rPr lang="en-US" smtClean="0"/>
+              <a:rPr lang="en-US"/>
               <a:t>Click to edit Master title style</a:t>
             </a:r>
-            <a:endParaRPr lang="en-US"/>
           </a:p>
         </p:txBody>
       </p:sp>
@@ -266,10 +2512,9 @@
           </a:lstStyle>
           <a:p>
             <a:r>
-              <a:rPr lang="en-US" smtClean="0"/>
+              <a:rPr lang="en-US"/>
               <a:t>Click to edit Master subtitle style</a:t>
             </a:r>
-            <a:endParaRPr lang="en-US"/>
           </a:p>
         </p:txBody>
       </p:sp>
@@ -291,7 +2536,7 @@
             <a:fld id="{1D8BD707-D9CF-40AE-B4C6-C98DA3205C09}" type="datetimeFigureOut">
               <a:rPr lang="en-US" smtClean="0"/>
               <a:pPr/>
-              <a:t>8/1/2011</a:t>
+              <a:t>11/5/2025</a:t>
             </a:fld>
             <a:endParaRPr lang="en-US"/>
           </a:p>
@@ -381,10 +2626,9 @@
           <a:lstStyle/>
           <a:p>
             <a:r>
-              <a:rPr lang="en-US" smtClean="0"/>
+              <a:rPr lang="en-US"/>
               <a:t>Click to edit Master title style</a:t>
             </a:r>
-            <a:endParaRPr lang="en-US"/>
           </a:p>
         </p:txBody>
       </p:sp>
@@ -405,38 +2649,37 @@
           <a:p>
             <a:pPr lvl="0"/>
             <a:r>
-              <a:rPr lang="en-US" smtClean="0"/>
+              <a:rPr lang="en-US"/>
               <a:t>Click to edit Master text styles</a:t>
             </a:r>
           </a:p>
           <a:p>
             <a:pPr lvl="1"/>
             <a:r>
-              <a:rPr lang="en-US" smtClean="0"/>
+              <a:rPr lang="en-US"/>
               <a:t>Second level</a:t>
             </a:r>
           </a:p>
           <a:p>
             <a:pPr lvl="2"/>
             <a:r>
-              <a:rPr lang="en-US" smtClean="0"/>
+              <a:rPr lang="en-US"/>
               <a:t>Third level</a:t>
             </a:r>
           </a:p>
           <a:p>
             <a:pPr lvl="3"/>
             <a:r>
-              <a:rPr lang="en-US" smtClean="0"/>
+              <a:rPr lang="en-US"/>
               <a:t>Fourth level</a:t>
             </a:r>
           </a:p>
           <a:p>
             <a:pPr lvl="4"/>
             <a:r>
-              <a:rPr lang="en-US" smtClean="0"/>
+              <a:rPr lang="en-US"/>
               <a:t>Fifth level</a:t>
             </a:r>
-            <a:endParaRPr lang="en-US"/>
           </a:p>
         </p:txBody>
       </p:sp>
@@ -458,7 +2701,7 @@
             <a:fld id="{1D8BD707-D9CF-40AE-B4C6-C98DA3205C09}" type="datetimeFigureOut">
               <a:rPr lang="en-US" smtClean="0"/>
               <a:pPr/>
-              <a:t>8/1/2011</a:t>
+              <a:t>11/5/2025</a:t>
             </a:fld>
             <a:endParaRPr lang="en-US"/>
           </a:p>
@@ -553,10 +2796,9 @@
           <a:lstStyle/>
           <a:p>
             <a:r>
-              <a:rPr lang="en-US" smtClean="0"/>
+              <a:rPr lang="en-US"/>
               <a:t>Click to edit Master title style</a:t>
             </a:r>
-            <a:endParaRPr lang="en-US"/>
           </a:p>
         </p:txBody>
       </p:sp>
@@ -582,38 +2824,37 @@
           <a:p>
             <a:pPr lvl="0"/>
             <a:r>
-              <a:rPr lang="en-US" smtClean="0"/>
+              <a:rPr lang="en-US"/>
               <a:t>Click to edit Master text styles</a:t>
             </a:r>
           </a:p>
           <a:p>
             <a:pPr lvl="1"/>
             <a:r>
-              <a:rPr lang="en-US" smtClean="0"/>
+              <a:rPr lang="en-US"/>
               <a:t>Second level</a:t>
             </a:r>
           </a:p>
           <a:p>
             <a:pPr lvl="2"/>
             <a:r>
-              <a:rPr lang="en-US" smtClean="0"/>
+              <a:rPr lang="en-US"/>
               <a:t>Third level</a:t>
             </a:r>
           </a:p>
           <a:p>
             <a:pPr lvl="3"/>
             <a:r>
-              <a:rPr lang="en-US" smtClean="0"/>
+              <a:rPr lang="en-US"/>
               <a:t>Fourth level</a:t>
             </a:r>
           </a:p>
           <a:p>
             <a:pPr lvl="4"/>
             <a:r>
-              <a:rPr lang="en-US" smtClean="0"/>
+              <a:rPr lang="en-US"/>
               <a:t>Fifth level</a:t>
             </a:r>
-            <a:endParaRPr lang="en-US"/>
           </a:p>
         </p:txBody>
       </p:sp>
@@ -635,7 +2876,7 @@
             <a:fld id="{1D8BD707-D9CF-40AE-B4C6-C98DA3205C09}" type="datetimeFigureOut">
               <a:rPr lang="en-US" smtClean="0"/>
               <a:pPr/>
-              <a:t>8/1/2011</a:t>
+              <a:t>11/5/2025</a:t>
             </a:fld>
             <a:endParaRPr lang="en-US"/>
           </a:p>
@@ -725,10 +2966,9 @@
           <a:lstStyle/>
           <a:p>
             <a:r>
-              <a:rPr lang="en-US" smtClean="0"/>
+              <a:rPr lang="en-US"/>
               <a:t>Click to edit Master title style</a:t>
             </a:r>
-            <a:endParaRPr lang="en-US"/>
           </a:p>
         </p:txBody>
       </p:sp>
@@ -749,38 +2989,37 @@
           <a:p>
             <a:pPr lvl="0"/>
             <a:r>
-              <a:rPr lang="en-US" smtClean="0"/>
+              <a:rPr lang="en-US"/>
               <a:t>Click to edit Master text styles</a:t>
             </a:r>
           </a:p>
           <a:p>
             <a:pPr lvl="1"/>
             <a:r>
-              <a:rPr lang="en-US" smtClean="0"/>
+              <a:rPr lang="en-US"/>
               <a:t>Second level</a:t>
             </a:r>
           </a:p>
           <a:p>
             <a:pPr lvl="2"/>
             <a:r>
-              <a:rPr lang="en-US" smtClean="0"/>
+              <a:rPr lang="en-US"/>
               <a:t>Third level</a:t>
             </a:r>
           </a:p>
           <a:p>
             <a:pPr lvl="3"/>
             <a:r>
-              <a:rPr lang="en-US" smtClean="0"/>
+              <a:rPr lang="en-US"/>
               <a:t>Fourth level</a:t>
             </a:r>
           </a:p>
           <a:p>
             <a:pPr lvl="4"/>
             <a:r>
-              <a:rPr lang="en-US" smtClean="0"/>
+              <a:rPr lang="en-US"/>
               <a:t>Fifth level</a:t>
             </a:r>
-            <a:endParaRPr lang="en-US"/>
           </a:p>
         </p:txBody>
       </p:sp>
@@ -802,7 +3041,7 @@
             <a:fld id="{1D8BD707-D9CF-40AE-B4C6-C98DA3205C09}" type="datetimeFigureOut">
               <a:rPr lang="en-US" smtClean="0"/>
               <a:pPr/>
-              <a:t>8/1/2011</a:t>
+              <a:t>11/5/2025</a:t>
             </a:fld>
             <a:endParaRPr lang="en-US"/>
           </a:p>
@@ -901,10 +3140,9 @@
           </a:lstStyle>
           <a:p>
             <a:r>
-              <a:rPr lang="en-US" smtClean="0"/>
+              <a:rPr lang="en-US"/>
               <a:t>Click to edit Master title style</a:t>
             </a:r>
-            <a:endParaRPr lang="en-US"/>
           </a:p>
         </p:txBody>
       </p:sp>
@@ -1021,7 +3259,7 @@
           <a:p>
             <a:pPr lvl="0"/>
             <a:r>
-              <a:rPr lang="en-US" smtClean="0"/>
+              <a:rPr lang="en-US"/>
               <a:t>Click to edit Master text styles</a:t>
             </a:r>
           </a:p>
@@ -1045,7 +3283,7 @@
             <a:fld id="{1D8BD707-D9CF-40AE-B4C6-C98DA3205C09}" type="datetimeFigureOut">
               <a:rPr lang="en-US" smtClean="0"/>
               <a:pPr/>
-              <a:t>8/1/2011</a:t>
+              <a:t>11/5/2025</a:t>
             </a:fld>
             <a:endParaRPr lang="en-US"/>
           </a:p>
@@ -1135,10 +3373,9 @@
           <a:lstStyle/>
           <a:p>
             <a:r>
-              <a:rPr lang="en-US" smtClean="0"/>
+              <a:rPr lang="en-US"/>
               <a:t>Click to edit Master title style</a:t>
             </a:r>
-            <a:endParaRPr lang="en-US"/>
           </a:p>
         </p:txBody>
       </p:sp>
@@ -1192,38 +3429,37 @@
           <a:p>
             <a:pPr lvl="0"/>
             <a:r>
-              <a:rPr lang="en-US" smtClean="0"/>
+              <a:rPr lang="en-US"/>
               <a:t>Click to edit Master text styles</a:t>
             </a:r>
           </a:p>
           <a:p>
             <a:pPr lvl="1"/>
             <a:r>
-              <a:rPr lang="en-US" smtClean="0"/>
+              <a:rPr lang="en-US"/>
               <a:t>Second level</a:t>
             </a:r>
           </a:p>
           <a:p>
             <a:pPr lvl="2"/>
             <a:r>
-              <a:rPr lang="en-US" smtClean="0"/>
+              <a:rPr lang="en-US"/>
               <a:t>Third level</a:t>
             </a:r>
           </a:p>
           <a:p>
             <a:pPr lvl="3"/>
             <a:r>
-              <a:rPr lang="en-US" smtClean="0"/>
+              <a:rPr lang="en-US"/>
               <a:t>Fourth level</a:t>
             </a:r>
           </a:p>
           <a:p>
             <a:pPr lvl="4"/>
             <a:r>
-              <a:rPr lang="en-US" smtClean="0"/>
+              <a:rPr lang="en-US"/>
               <a:t>Fifth level</a:t>
             </a:r>
-            <a:endParaRPr lang="en-US"/>
           </a:p>
         </p:txBody>
       </p:sp>
@@ -1277,38 +3513,37 @@
           <a:p>
             <a:pPr lvl="0"/>
             <a:r>
-              <a:rPr lang="en-US" smtClean="0"/>
+              <a:rPr lang="en-US"/>
               <a:t>Click to edit Master text styles</a:t>
             </a:r>
           </a:p>
           <a:p>
             <a:pPr lvl="1"/>
             <a:r>
-              <a:rPr lang="en-US" smtClean="0"/>
+              <a:rPr lang="en-US"/>
               <a:t>Second level</a:t>
             </a:r>
           </a:p>
           <a:p>
             <a:pPr lvl="2"/>
             <a:r>
-              <a:rPr lang="en-US" smtClean="0"/>
+              <a:rPr lang="en-US"/>
               <a:t>Third level</a:t>
             </a:r>
           </a:p>
           <a:p>
             <a:pPr lvl="3"/>
             <a:r>
-              <a:rPr lang="en-US" smtClean="0"/>
+              <a:rPr lang="en-US"/>
               <a:t>Fourth level</a:t>
             </a:r>
           </a:p>
           <a:p>
             <a:pPr lvl="4"/>
             <a:r>
-              <a:rPr lang="en-US" smtClean="0"/>
+              <a:rPr lang="en-US"/>
               <a:t>Fifth level</a:t>
             </a:r>
-            <a:endParaRPr lang="en-US"/>
           </a:p>
         </p:txBody>
       </p:sp>
@@ -1330,7 +3565,7 @@
             <a:fld id="{1D8BD707-D9CF-40AE-B4C6-C98DA3205C09}" type="datetimeFigureOut">
               <a:rPr lang="en-US" smtClean="0"/>
               <a:pPr/>
-              <a:t>8/1/2011</a:t>
+              <a:t>11/5/2025</a:t>
             </a:fld>
             <a:endParaRPr lang="en-US"/>
           </a:p>
@@ -1424,10 +3659,9 @@
           </a:lstStyle>
           <a:p>
             <a:r>
-              <a:rPr lang="en-US" smtClean="0"/>
+              <a:rPr lang="en-US"/>
               <a:t>Click to edit Master title style</a:t>
             </a:r>
-            <a:endParaRPr lang="en-US"/>
           </a:p>
         </p:txBody>
       </p:sp>
@@ -1490,7 +3724,7 @@
           <a:p>
             <a:pPr lvl="0"/>
             <a:r>
-              <a:rPr lang="en-US" smtClean="0"/>
+              <a:rPr lang="en-US"/>
               <a:t>Click to edit Master text styles</a:t>
             </a:r>
           </a:p>
@@ -1546,38 +3780,37 @@
           <a:p>
             <a:pPr lvl="0"/>
             <a:r>
-              <a:rPr lang="en-US" smtClean="0"/>
+              <a:rPr lang="en-US"/>
               <a:t>Click to edit Master text styles</a:t>
             </a:r>
           </a:p>
           <a:p>
             <a:pPr lvl="1"/>
             <a:r>
-              <a:rPr lang="en-US" smtClean="0"/>
+              <a:rPr lang="en-US"/>
               <a:t>Second level</a:t>
             </a:r>
           </a:p>
           <a:p>
             <a:pPr lvl="2"/>
             <a:r>
-              <a:rPr lang="en-US" smtClean="0"/>
+              <a:rPr lang="en-US"/>
               <a:t>Third level</a:t>
             </a:r>
           </a:p>
           <a:p>
             <a:pPr lvl="3"/>
             <a:r>
-              <a:rPr lang="en-US" smtClean="0"/>
+              <a:rPr lang="en-US"/>
               <a:t>Fourth level</a:t>
             </a:r>
           </a:p>
           <a:p>
             <a:pPr lvl="4"/>
             <a:r>
-              <a:rPr lang="en-US" smtClean="0"/>
+              <a:rPr lang="en-US"/>
               <a:t>Fifth level</a:t>
             </a:r>
-            <a:endParaRPr lang="en-US"/>
           </a:p>
         </p:txBody>
       </p:sp>
@@ -1640,7 +3873,7 @@
           <a:p>
             <a:pPr lvl="0"/>
             <a:r>
-              <a:rPr lang="en-US" smtClean="0"/>
+              <a:rPr lang="en-US"/>
               <a:t>Click to edit Master text styles</a:t>
             </a:r>
           </a:p>
@@ -1696,38 +3929,37 @@
           <a:p>
             <a:pPr lvl="0"/>
             <a:r>
-              <a:rPr lang="en-US" smtClean="0"/>
+              <a:rPr lang="en-US"/>
               <a:t>Click to edit Master text styles</a:t>
             </a:r>
           </a:p>
           <a:p>
             <a:pPr lvl="1"/>
             <a:r>
-              <a:rPr lang="en-US" smtClean="0"/>
+              <a:rPr lang="en-US"/>
               <a:t>Second level</a:t>
             </a:r>
           </a:p>
           <a:p>
             <a:pPr lvl="2"/>
             <a:r>
-              <a:rPr lang="en-US" smtClean="0"/>
+              <a:rPr lang="en-US"/>
               <a:t>Third level</a:t>
             </a:r>
           </a:p>
           <a:p>
             <a:pPr lvl="3"/>
             <a:r>
-              <a:rPr lang="en-US" smtClean="0"/>
+              <a:rPr lang="en-US"/>
               <a:t>Fourth level</a:t>
             </a:r>
           </a:p>
           <a:p>
             <a:pPr lvl="4"/>
             <a:r>
-              <a:rPr lang="en-US" smtClean="0"/>
+              <a:rPr lang="en-US"/>
               <a:t>Fifth level</a:t>
             </a:r>
-            <a:endParaRPr lang="en-US"/>
           </a:p>
         </p:txBody>
       </p:sp>
@@ -1749,7 +3981,7 @@
             <a:fld id="{1D8BD707-D9CF-40AE-B4C6-C98DA3205C09}" type="datetimeFigureOut">
               <a:rPr lang="en-US" smtClean="0"/>
               <a:pPr/>
-              <a:t>8/1/2011</a:t>
+              <a:t>11/5/2025</a:t>
             </a:fld>
             <a:endParaRPr lang="en-US"/>
           </a:p>
@@ -1839,10 +4071,9 @@
           <a:lstStyle/>
           <a:p>
             <a:r>
-              <a:rPr lang="en-US" smtClean="0"/>
+              <a:rPr lang="en-US"/>
               <a:t>Click to edit Master title style</a:t>
             </a:r>
-            <a:endParaRPr lang="en-US"/>
           </a:p>
         </p:txBody>
       </p:sp>
@@ -1864,7 +4095,7 @@
             <a:fld id="{1D8BD707-D9CF-40AE-B4C6-C98DA3205C09}" type="datetimeFigureOut">
               <a:rPr lang="en-US" smtClean="0"/>
               <a:pPr/>
-              <a:t>8/1/2011</a:t>
+              <a:t>11/5/2025</a:t>
             </a:fld>
             <a:endParaRPr lang="en-US"/>
           </a:p>
@@ -1956,7 +4187,7 @@
             <a:fld id="{1D8BD707-D9CF-40AE-B4C6-C98DA3205C09}" type="datetimeFigureOut">
               <a:rPr lang="en-US" smtClean="0"/>
               <a:pPr/>
-              <a:t>8/1/2011</a:t>
+              <a:t>11/5/2025</a:t>
             </a:fld>
             <a:endParaRPr lang="en-US"/>
           </a:p>
@@ -2055,10 +4286,9 @@
           </a:lstStyle>
           <a:p>
             <a:r>
-              <a:rPr lang="en-US" smtClean="0"/>
+              <a:rPr lang="en-US"/>
               <a:t>Click to edit Master title style</a:t>
             </a:r>
-            <a:endParaRPr lang="en-US"/>
           </a:p>
         </p:txBody>
       </p:sp>
@@ -2112,38 +4342,37 @@
           <a:p>
             <a:pPr lvl="0"/>
             <a:r>
-              <a:rPr lang="en-US" smtClean="0"/>
+              <a:rPr lang="en-US"/>
               <a:t>Click to edit Master text styles</a:t>
             </a:r>
           </a:p>
           <a:p>
             <a:pPr lvl="1"/>
             <a:r>
-              <a:rPr lang="en-US" smtClean="0"/>
+              <a:rPr lang="en-US"/>
               <a:t>Second level</a:t>
             </a:r>
           </a:p>
           <a:p>
             <a:pPr lvl="2"/>
             <a:r>
-              <a:rPr lang="en-US" smtClean="0"/>
+              <a:rPr lang="en-US"/>
               <a:t>Third level</a:t>
             </a:r>
           </a:p>
           <a:p>
             <a:pPr lvl="3"/>
             <a:r>
-              <a:rPr lang="en-US" smtClean="0"/>
+              <a:rPr lang="en-US"/>
               <a:t>Fourth level</a:t>
             </a:r>
           </a:p>
           <a:p>
             <a:pPr lvl="4"/>
             <a:r>
-              <a:rPr lang="en-US" smtClean="0"/>
+              <a:rPr lang="en-US"/>
               <a:t>Fifth level</a:t>
             </a:r>
-            <a:endParaRPr lang="en-US"/>
           </a:p>
         </p:txBody>
       </p:sp>
@@ -2206,7 +4435,7 @@
           <a:p>
             <a:pPr lvl="0"/>
             <a:r>
-              <a:rPr lang="en-US" smtClean="0"/>
+              <a:rPr lang="en-US"/>
               <a:t>Click to edit Master text styles</a:t>
             </a:r>
           </a:p>
@@ -2230,7 +4459,7 @@
             <a:fld id="{1D8BD707-D9CF-40AE-B4C6-C98DA3205C09}" type="datetimeFigureOut">
               <a:rPr lang="en-US" smtClean="0"/>
               <a:pPr/>
-              <a:t>8/1/2011</a:t>
+              <a:t>11/5/2025</a:t>
             </a:fld>
             <a:endParaRPr lang="en-US"/>
           </a:p>
@@ -2329,10 +4558,9 @@
           </a:lstStyle>
           <a:p>
             <a:r>
-              <a:rPr lang="en-US" smtClean="0"/>
+              <a:rPr lang="en-US"/>
               <a:t>Click to edit Master title style</a:t>
             </a:r>
-            <a:endParaRPr lang="en-US"/>
           </a:p>
         </p:txBody>
       </p:sp>
@@ -2456,7 +4684,7 @@
           <a:p>
             <a:pPr lvl="0"/>
             <a:r>
-              <a:rPr lang="en-US" smtClean="0"/>
+              <a:rPr lang="en-US"/>
               <a:t>Click to edit Master text styles</a:t>
             </a:r>
           </a:p>
@@ -2480,7 +4708,7 @@
             <a:fld id="{1D8BD707-D9CF-40AE-B4C6-C98DA3205C09}" type="datetimeFigureOut">
               <a:rPr lang="en-US" smtClean="0"/>
               <a:pPr/>
-              <a:t>8/1/2011</a:t>
+              <a:t>11/5/2025</a:t>
             </a:fld>
             <a:endParaRPr lang="en-US"/>
           </a:p>
@@ -2585,10 +4813,9 @@
           <a:lstStyle/>
           <a:p>
             <a:r>
-              <a:rPr lang="en-US" smtClean="0"/>
+              <a:rPr lang="en-US"/>
               <a:t>Click to edit Master title style</a:t>
             </a:r>
-            <a:endParaRPr lang="en-US"/>
           </a:p>
         </p:txBody>
       </p:sp>
@@ -2619,38 +4846,37 @@
           <a:p>
             <a:pPr lvl="0"/>
             <a:r>
-              <a:rPr lang="en-US" smtClean="0"/>
+              <a:rPr lang="en-US"/>
               <a:t>Click to edit Master text styles</a:t>
             </a:r>
           </a:p>
           <a:p>
             <a:pPr lvl="1"/>
             <a:r>
-              <a:rPr lang="en-US" smtClean="0"/>
+              <a:rPr lang="en-US"/>
               <a:t>Second level</a:t>
             </a:r>
           </a:p>
           <a:p>
             <a:pPr lvl="2"/>
             <a:r>
-              <a:rPr lang="en-US" smtClean="0"/>
+              <a:rPr lang="en-US"/>
               <a:t>Third level</a:t>
             </a:r>
           </a:p>
           <a:p>
             <a:pPr lvl="3"/>
             <a:r>
-              <a:rPr lang="en-US" smtClean="0"/>
+              <a:rPr lang="en-US"/>
               <a:t>Fourth level</a:t>
             </a:r>
           </a:p>
           <a:p>
             <a:pPr lvl="4"/>
             <a:r>
-              <a:rPr lang="en-US" smtClean="0"/>
+              <a:rPr lang="en-US"/>
               <a:t>Fifth level</a:t>
             </a:r>
-            <a:endParaRPr lang="en-US"/>
           </a:p>
         </p:txBody>
       </p:sp>
@@ -2690,7 +4916,7 @@
             <a:fld id="{1D8BD707-D9CF-40AE-B4C6-C98DA3205C09}" type="datetimeFigureOut">
               <a:rPr lang="en-US" smtClean="0"/>
               <a:pPr/>
-              <a:t>8/1/2011</a:t>
+              <a:t>11/5/2025</a:t>
             </a:fld>
             <a:endParaRPr lang="en-US"/>
           </a:p>
@@ -3045,7 +5271,7 @@
 </file>
 
 <file path=ppt/slides/slide1.xml><?xml version="1.0" encoding="utf-8"?>
-<p:sld xmlns:p="http://schemas.openxmlformats.org/presentationml/2006/main" xmlns:a="http://schemas.openxmlformats.org/drawingml/2006/main">
+<p:sld xmlns:a="http://schemas.openxmlformats.org/drawingml/2006/main" xmlns:r="http://schemas.openxmlformats.org/officeDocument/2006/relationships" xmlns:p="http://schemas.openxmlformats.org/presentationml/2006/main">
   <p:cSld>
     <p:spTree>
       <p:nvGrpSpPr>
@@ -3063,7 +5289,7 @@
       </p:grpSpPr>
       <p:sp>
         <p:nvSpPr>
-          <p:cNvPr name="AutoShape 2" id="2"/>
+          <p:cNvPr id="2" name="AutoShape 2"/>
           <p:cNvSpPr/>
           <p:nvPr/>
         </p:nvSpPr>
@@ -3080,7 +5306,7 @@
           </a:solidFill>
         </p:spPr>
         <p:txBody>
-          <a:bodyPr anchor="t" rtlCol="false"/>
+          <a:bodyPr rtlCol="0" anchor="t"/>
           <a:lstStyle/>
           <a:p>
             <a:pPr algn="ctr">
@@ -3100,7 +5326,7 @@
       </p:sp>
       <p:sp>
         <p:nvSpPr>
-          <p:cNvPr name="AutoShape 3" id="3"/>
+          <p:cNvPr id="3" name="AutoShape 3"/>
           <p:cNvSpPr/>
           <p:nvPr/>
         </p:nvSpPr>
@@ -3122,21 +5348,24 @@
           </a:ln>
         </p:spPr>
         <p:txBody>
-          <a:bodyPr anchor="t" rtlCol="false"/>
+          <a:bodyPr rtlCol="0" anchor="t"/>
           <a:lstStyle/>
           <a:p>
             <a:pPr algn="ctr">
               <a:defRPr/>
             </a:pPr>
             <a:r>
-              <a:rPr lang="en-US" sz="4400" b="true">
+              <a:rPr lang="en-US" sz="4400" b="1" dirty="0">
                 <a:solidFill>
                   <a:srgbClr val="4682B4"/>
                 </a:solidFill>
+                <a:latin typeface="Harlow Solid Italic" panose="04030604020F02020D02" pitchFamily="82" charset="0"/>
               </a:rPr>
-              <a:t>{TITLE}</a:t>
-            </a:r>
-            <a:endParaRPr lang="en-US" sz="1100"/>
+              <a:t>{TITLE}test</a:t>
+            </a:r>
+            <a:endParaRPr lang="en-US" sz="1100" dirty="0">
+              <a:latin typeface="Harlow Solid Italic" panose="04030604020F02020D02" pitchFamily="82" charset="0"/>
+            </a:endParaRPr>
           </a:p>
         </p:txBody>
       </p:sp>
@@ -3149,7 +5378,7 @@
 </file>
 
 <file path=ppt/slides/slide2.xml><?xml version="1.0" encoding="utf-8"?>
-<p:sld xmlns:p="http://schemas.openxmlformats.org/presentationml/2006/main" xmlns:a="http://schemas.openxmlformats.org/drawingml/2006/main">
+<p:sld xmlns:a="http://schemas.openxmlformats.org/drawingml/2006/main" xmlns:r="http://schemas.openxmlformats.org/officeDocument/2006/relationships" xmlns:p="http://schemas.openxmlformats.org/presentationml/2006/main">
   <p:cSld>
     <p:spTree>
       <p:nvGrpSpPr>
@@ -3167,7 +5396,7 @@
       </p:grpSpPr>
       <p:sp>
         <p:nvSpPr>
-          <p:cNvPr name="AutoShape 2" id="2"/>
+          <p:cNvPr id="2" name="AutoShape 2"/>
           <p:cNvSpPr/>
           <p:nvPr/>
         </p:nvSpPr>
@@ -3187,14 +5416,14 @@
           </a:ln>
         </p:spPr>
         <p:txBody>
-          <a:bodyPr anchor="t" rtlCol="false"/>
+          <a:bodyPr rtlCol="0" anchor="t"/>
           <a:lstStyle/>
           <a:p>
             <a:pPr algn="ctr">
               <a:defRPr/>
             </a:pPr>
             <a:r>
-              <a:rPr lang="en-US" sz="3200" b="true">
+              <a:rPr lang="en-US" sz="3200" b="1">
                 <a:solidFill>
                   <a:srgbClr val="333333"/>
                 </a:solidFill>
@@ -3207,7 +5436,7 @@
       </p:sp>
       <p:sp>
         <p:nvSpPr>
-          <p:cNvPr name="AutoShape 3" id="3"/>
+          <p:cNvPr id="3" name="AutoShape 3"/>
           <p:cNvSpPr/>
           <p:nvPr/>
         </p:nvSpPr>
@@ -3229,7 +5458,7 @@
           </a:ln>
         </p:spPr>
         <p:txBody>
-          <a:bodyPr anchor="t" rtlCol="false"/>
+          <a:bodyPr rtlCol="0" anchor="t"/>
           <a:lstStyle/>
           <a:p>
             <a:pPr algn="ctr">
@@ -3249,7 +5478,7 @@
       </p:sp>
       <p:sp>
         <p:nvSpPr>
-          <p:cNvPr name="AutoShape 4" id="4"/>
+          <p:cNvPr id="4" name="AutoShape 4"/>
           <p:cNvSpPr/>
           <p:nvPr/>
         </p:nvSpPr>
@@ -3271,7 +5500,7 @@
           </a:ln>
         </p:spPr>
         <p:txBody>
-          <a:bodyPr anchor="t" rtlCol="false"/>
+          <a:bodyPr rtlCol="0" anchor="t"/>
           <a:lstStyle/>
           <a:p>
             <a:pPr algn="ctr">
@@ -3291,7 +5520,7 @@
       </p:sp>
       <p:sp>
         <p:nvSpPr>
-          <p:cNvPr name="AutoShape 5" id="5"/>
+          <p:cNvPr id="5" name="AutoShape 5"/>
           <p:cNvSpPr/>
           <p:nvPr/>
         </p:nvSpPr>
@@ -3313,7 +5542,7 @@
           </a:ln>
         </p:spPr>
         <p:txBody>
-          <a:bodyPr anchor="t" rtlCol="false"/>
+          <a:bodyPr rtlCol="0" anchor="t"/>
           <a:lstStyle/>
           <a:p>
             <a:pPr algn="ctr">
@@ -3331,48 +5560,37 @@
           </a:p>
         </p:txBody>
       </p:sp>
-      <p:sp>
-        <p:nvSpPr>
-          <p:cNvPr name="AutoShape 6" id="6"/>
-          <p:cNvSpPr/>
-          <p:nvPr/>
-        </p:nvSpPr>
-        <p:spPr>
-          <a:xfrm>
-            <a:off x="635000" y="3556000"/>
-            <a:ext cx="7874000" cy="2794000"/>
-          </a:xfrm>
-          <a:prstGeom prst="rect">
-            <a:avLst/>
-          </a:prstGeom>
-          <a:solidFill>
-            <a:srgbClr val="F5F5F5"/>
-          </a:solidFill>
-          <a:ln w="25400">
-            <a:solidFill>
-              <a:srgbClr val="4682B4"/>
-            </a:solidFill>
-          </a:ln>
-        </p:spPr>
-        <p:txBody>
-          <a:bodyPr anchor="t" rtlCol="false"/>
-          <a:lstStyle/>
-          <a:p>
-            <a:pPr algn="ctr">
-              <a:defRPr/>
-            </a:pPr>
-            <a:r>
-              <a:rPr lang="en-US" sz="2400">
-                <a:solidFill>
-                  <a:srgbClr val="808080"/>
-                </a:solidFill>
-              </a:rPr>
-              <a:t>[Grafico]</a:t>
-            </a:r>
-            <a:endParaRPr lang="en-US" sz="1100"/>
-          </a:p>
-        </p:txBody>
-      </p:sp>
+      <p:graphicFrame>
+        <p:nvGraphicFramePr>
+          <p:cNvPr id="7" name="Chart 3">
+            <a:extLst>
+              <a:ext uri="{FF2B5EF4-FFF2-40B4-BE49-F238E27FC236}">
+                <a16:creationId xmlns:a16="http://schemas.microsoft.com/office/drawing/2014/main" id="{135F4584-CA53-81DB-FD2F-EA1FCC927B71}"/>
+              </a:ext>
+            </a:extLst>
+          </p:cNvPr>
+          <p:cNvGraphicFramePr/>
+          <p:nvPr>
+            <p:custDataLst>
+              <p:tags r:id="rId1"/>
+            </p:custDataLst>
+            <p:extLst>
+              <p:ext uri="{D42A27DB-BD31-4B8C-83A1-F6EECF244321}">
+                <p14:modId xmlns:p14="http://schemas.microsoft.com/office/powerpoint/2010/main" val="3466289430"/>
+              </p:ext>
+            </p:extLst>
+          </p:nvPr>
+        </p:nvGraphicFramePr>
+        <p:xfrm>
+          <a:off x="635000" y="3657600"/>
+          <a:ext cx="7874000" cy="2819400"/>
+        </p:xfrm>
+        <a:graphic>
+          <a:graphicData uri="http://schemas.openxmlformats.org/drawingml/2006/chart">
+            <c:chart xmlns:c="http://schemas.openxmlformats.org/drawingml/2006/chart" xmlns:r="http://schemas.openxmlformats.org/officeDocument/2006/relationships" r:id="rId3"/>
+          </a:graphicData>
+        </a:graphic>
+      </p:graphicFrame>
     </p:spTree>
   </p:cSld>
   <p:clrMapOvr>
@@ -3382,7 +5600,7 @@
 </file>
 
 <file path=ppt/slides/slide3.xml><?xml version="1.0" encoding="utf-8"?>
-<p:sld xmlns:p="http://schemas.openxmlformats.org/presentationml/2006/main" xmlns:a="http://schemas.openxmlformats.org/drawingml/2006/main">
+<p:sld xmlns:a="http://schemas.openxmlformats.org/drawingml/2006/main" xmlns:r="http://schemas.openxmlformats.org/officeDocument/2006/relationships" xmlns:p="http://schemas.openxmlformats.org/presentationml/2006/main">
   <p:cSld>
     <p:spTree>
       <p:nvGrpSpPr>
@@ -3400,7 +5618,7 @@
       </p:grpSpPr>
       <p:sp>
         <p:nvSpPr>
-          <p:cNvPr name="AutoShape 2" id="2"/>
+          <p:cNvPr id="2" name="AutoShape 2"/>
           <p:cNvSpPr/>
           <p:nvPr/>
         </p:nvSpPr>
@@ -3420,14 +5638,14 @@
           </a:ln>
         </p:spPr>
         <p:txBody>
-          <a:bodyPr anchor="t" rtlCol="false"/>
+          <a:bodyPr rtlCol="0" anchor="t"/>
           <a:lstStyle/>
           <a:p>
             <a:pPr algn="ctr">
               <a:defRPr/>
             </a:pPr>
             <a:r>
-              <a:rPr lang="en-US" sz="4000" b="true">
+              <a:rPr lang="en-US" sz="4000" b="1">
                 <a:solidFill>
                   <a:srgbClr val="4682B4"/>
                 </a:solidFill>
@@ -3440,7 +5658,7 @@
       </p:sp>
       <p:sp>
         <p:nvSpPr>
-          <p:cNvPr name="AutoShape 3" id="3"/>
+          <p:cNvPr id="3" name="AutoShape 3"/>
           <p:cNvSpPr/>
           <p:nvPr/>
         </p:nvSpPr>
@@ -3460,7 +5678,7 @@
           </a:ln>
         </p:spPr>
         <p:txBody>
-          <a:bodyPr anchor="t" rtlCol="false"/>
+          <a:bodyPr rtlCol="0" anchor="t"/>
           <a:lstStyle/>
           <a:p>
             <a:pPr algn="ctr">
@@ -3486,6 +5704,12 @@
     <a:masterClrMapping/>
   </p:clrMapOvr>
 </p:sld>
+</file>
+
+<file path=ppt/tags/tag1.xml><?xml version="1.0" encoding="utf-8"?>
+<p:tagLst xmlns:a="http://schemas.openxmlformats.org/drawingml/2006/main" xmlns:r="http://schemas.openxmlformats.org/officeDocument/2006/relationships" xmlns:p="http://schemas.openxmlformats.org/presentationml/2006/main">
+  <p:tag name="THINKCELLSHAPEDONOTDELETE" val="tSvoGXQ6tFj6ArNtWkn3jcQ"/>
+</p:tagLst>
 </file>
 
 <file path=ppt/theme/theme1.xml><?xml version="1.0" encoding="utf-8"?>

</xml_diff>

<commit_message>
Fix chart data update - now updates both cache and embedded Excel file
Co-authored-by: valerioddd <45196318+valerioddd@users.noreply.github.com>
</commit_message>
<xml_diff>
--- a/src/main/resources/templates/presentation-template.pptx
+++ b/src/main/resources/templates/presentation-template.pptx
@@ -5993,4 +5993,8 @@
   <a:objectDefaults/>
   <a:extraClrSchemeLst/>
 </a:theme>
+</file>
+
+<file path=chart1-formatted.xml>bash: xmllint: command not found
+
 </file>
</xml_diff>